<commit_message>
Slide Unit 2: Evaluation Metrics for classification models (completed)
</commit_message>
<xml_diff>
--- a/Data Science resources/Introduction to Machine Learning/Slides/Slide Unit 2/3. Evaluation Metrics for Classification Models.pptx
+++ b/Data Science resources/Introduction to Machine Learning/Slides/Slide Unit 2/3. Evaluation Metrics for Classification Models.pptx
@@ -2,8 +2,8 @@
 <file path=ppt/presentation.xml><?xml version="1.0" encoding="utf-8"?>
 <p:presentation xmlns:a="http://schemas.openxmlformats.org/drawingml/2006/main" xmlns:r="http://schemas.openxmlformats.org/officeDocument/2006/relationships" xmlns:p="http://schemas.openxmlformats.org/presentationml/2006/main" saveSubsetFonts="1">
   <p:sldMasterIdLst>
-    <p:sldMasterId id="2147483660" r:id="rId4"/>
-    <p:sldMasterId id="2147483668" r:id="rId5"/>
+    <p:sldMasterId id="2147483668" r:id="rId4"/>
+    <p:sldMasterId id="2147483675" r:id="rId5"/>
   </p:sldMasterIdLst>
   <p:notesMasterIdLst>
     <p:notesMasterId r:id="rId15"/>
@@ -12,7 +12,7 @@
     <p:handoutMasterId r:id="rId16"/>
   </p:handoutMasterIdLst>
   <p:sldIdLst>
-    <p:sldId id="256" r:id="rId6"/>
+    <p:sldId id="747" r:id="rId6"/>
     <p:sldId id="693" r:id="rId7"/>
     <p:sldId id="740" r:id="rId8"/>
     <p:sldId id="741" r:id="rId9"/>
@@ -124,7 +124,7 @@
       <p14:sectionLst xmlns:p14="http://schemas.microsoft.com/office/powerpoint/2010/main">
         <p14:section name="Default Section" id="{06CDF7AC-AF6E-4614-B140-2231D9F8B510}">
           <p14:sldIdLst>
-            <p14:sldId id="256"/>
+            <p14:sldId id="747"/>
             <p14:sldId id="693"/>
             <p14:sldId id="740"/>
             <p14:sldId id="741"/>
@@ -253,7 +253,7 @@
           <a:p>
             <a:fld id="{E4DABB7E-5FD5-4FD4-8200-24B5A1924914}" type="datetimeFigureOut">
               <a:rPr lang="en-US" smtClean="0"/>
-              <a:t>29-Aug-21</a:t>
+              <a:t>03-May-24</a:t>
             </a:fld>
             <a:endParaRPr lang="en-US"/>
           </a:p>
@@ -430,7 +430,7 @@
           <a:p>
             <a:fld id="{9BDC6C4C-B340-4EE6-8690-61E4F94D1E11}" type="datetimeFigureOut">
               <a:rPr lang="en-US" smtClean="0"/>
-              <a:t>29-Aug-21</a:t>
+              <a:t>03-May-24</a:t>
             </a:fld>
             <a:endParaRPr lang="en-US"/>
           </a:p>
@@ -1694,12 +1694,9 @@
 <p:sldLayout xmlns:a="http://schemas.openxmlformats.org/drawingml/2006/main" xmlns:r="http://schemas.openxmlformats.org/officeDocument/2006/relationships" xmlns:p="http://schemas.openxmlformats.org/presentationml/2006/main" type="title" preserve="1">
   <p:cSld name="Title Slide">
     <p:bg>
-      <p:bgPr>
-        <a:solidFill>
-          <a:srgbClr val="F8F9F7"/>
-        </a:solidFill>
-        <a:effectLst/>
-      </p:bgPr>
+      <p:bgRef idx="1001">
+        <a:schemeClr val="bg1"/>
+      </p:bgRef>
     </p:bg>
     <p:spTree>
       <p:nvGrpSpPr>
@@ -1723,7 +1720,7 @@
           </p:cNvGraphicFramePr>
           <p:nvPr userDrawn="1">
             <p:custDataLst>
-              <p:tags r:id="rId1"/>
+              <p:tags r:id="rId2"/>
             </p:custDataLst>
           </p:nvPr>
         </p:nvGraphicFramePr>
@@ -1735,12 +1732,12 @@
           <a:graphicData uri="http://schemas.openxmlformats.org/presentationml/2006/ole">
             <mc:AlternateContent xmlns:mc="http://schemas.openxmlformats.org/markup-compatibility/2006">
               <mc:Choice xmlns:v="urn:schemas-microsoft-com:vml" Requires="v">
-                <p:oleObj name="think-cell Slide" r:id="rId3" imgW="425" imgH="426" progId="TCLayout.ActiveDocument.1">
+                <p:oleObj spid="_x0000_s7171" name="think-cell Slide" r:id="rId4" imgW="425" imgH="426" progId="TCLayout.ActiveDocument.1">
                   <p:embed/>
                 </p:oleObj>
               </mc:Choice>
               <mc:Fallback>
-                <p:oleObj name="think-cell Slide" r:id="rId3" imgW="425" imgH="426" progId="TCLayout.ActiveDocument.1">
+                <p:oleObj name="think-cell Slide" r:id="rId4" imgW="425" imgH="426" progId="TCLayout.ActiveDocument.1">
                   <p:embed/>
                   <p:pic>
                     <p:nvPicPr>
@@ -1749,7 +1746,7 @@
                       <p:nvPr/>
                     </p:nvPicPr>
                     <p:blipFill>
-                      <a:blip r:embed="rId4"/>
+                      <a:blip r:embed="rId5"/>
                       <a:stretch>
                         <a:fillRect/>
                       </a:stretch>
@@ -1943,45 +1940,181 @@
       </p:sp>
       <p:pic>
         <p:nvPicPr>
-          <p:cNvPr id="9" name="Picture 8">
+          <p:cNvPr id="6" name="Picture 5">
             <a:extLst>
               <a:ext uri="{FF2B5EF4-FFF2-40B4-BE49-F238E27FC236}">
-                <a16:creationId xmlns:a16="http://schemas.microsoft.com/office/drawing/2014/main" id="{CDF206B8-267D-4DDA-BFAC-7BB3AA75D2B2}"/>
+                <a16:creationId xmlns:a16="http://schemas.microsoft.com/office/drawing/2014/main" id="{829BA2F8-E922-40A4-8489-65AA4A1F35E1}"/>
               </a:ext>
             </a:extLst>
           </p:cNvPr>
-          <p:cNvPicPr/>
+          <p:cNvPicPr>
+            <a:picLocks noChangeAspect="1"/>
+          </p:cNvPicPr>
           <p:nvPr userDrawn="1"/>
         </p:nvPicPr>
-        <p:blipFill rotWithShape="1">
-          <a:blip r:embed="rId5">
-            <a:extLst>
-              <a:ext uri="{28A0092B-C50C-407E-A947-70E740481C1C}">
-                <a14:useLocalDpi xmlns:a14="http://schemas.microsoft.com/office/drawing/2010/main" val="0"/>
-              </a:ext>
-            </a:extLst>
-          </a:blip>
-          <a:srcRect l="4423" t="4333" r="3217" b="7247"/>
-          <a:stretch/>
+        <p:blipFill>
+          <a:blip r:embed="rId6"/>
+          <a:stretch>
+            <a:fillRect/>
+          </a:stretch>
         </p:blipFill>
-        <p:spPr bwMode="auto">
+        <p:spPr>
           <a:xfrm>
-            <a:off x="928914" y="899880"/>
-            <a:ext cx="10000343" cy="4107543"/>
+            <a:off x="0" y="273056"/>
+            <a:ext cx="5991225" cy="6000750"/>
           </a:xfrm>
           <a:prstGeom prst="rect">
             <a:avLst/>
           </a:prstGeom>
-          <a:noFill/>
-          <a:ln>
-            <a:noFill/>
-          </a:ln>
         </p:spPr>
       </p:pic>
     </p:spTree>
     <p:extLst>
       <p:ext uri="{BB962C8B-B14F-4D97-AF65-F5344CB8AC3E}">
-        <p14:creationId xmlns:p14="http://schemas.microsoft.com/office/powerpoint/2010/main" val="438620834"/>
+        <p14:creationId xmlns:p14="http://schemas.microsoft.com/office/powerpoint/2010/main" val="2450602093"/>
+      </p:ext>
+    </p:extLst>
+  </p:cSld>
+  <p:clrMapOvr>
+    <a:overrideClrMapping bg1="lt1" tx1="dk1" bg2="lt2" tx2="dk2" accent1="accent1" accent2="accent2" accent3="accent3" accent4="accent4" accent5="accent5" accent6="accent6" hlink="hlink" folHlink="folHlink"/>
+  </p:clrMapOvr>
+</p:sldLayout>
+</file>
+
+<file path=ppt/slideLayouts/slideLayout2.xml><?xml version="1.0" encoding="utf-8"?>
+<p:sldLayout xmlns:a="http://schemas.openxmlformats.org/drawingml/2006/main" xmlns:r="http://schemas.openxmlformats.org/officeDocument/2006/relationships" xmlns:p="http://schemas.openxmlformats.org/presentationml/2006/main" preserve="1" userDrawn="1">
+  <p:cSld name="7_Title Slide">
+    <p:spTree>
+      <p:nvGrpSpPr>
+        <p:cNvPr id="1" name=""/>
+        <p:cNvGrpSpPr/>
+        <p:nvPr/>
+      </p:nvGrpSpPr>
+      <p:grpSpPr>
+        <a:xfrm>
+          <a:off x="0" y="0"/>
+          <a:ext cx="0" cy="0"/>
+          <a:chOff x="0" y="0"/>
+          <a:chExt cx="0" cy="0"/>
+        </a:xfrm>
+      </p:grpSpPr>
+      <p:sp>
+        <p:nvSpPr>
+          <p:cNvPr id="4" name="Rectangle 3">
+            <a:extLst>
+              <a:ext uri="{FF2B5EF4-FFF2-40B4-BE49-F238E27FC236}">
+                <a16:creationId xmlns:a16="http://schemas.microsoft.com/office/drawing/2014/main" id="{31C53266-8226-4323-93D8-8635471CF311}"/>
+              </a:ext>
+            </a:extLst>
+          </p:cNvPr>
+          <p:cNvSpPr/>
+          <p:nvPr userDrawn="1"/>
+        </p:nvSpPr>
+        <p:spPr>
+          <a:xfrm>
+            <a:off x="0" y="-6"/>
+            <a:ext cx="12191996" cy="6858005"/>
+          </a:xfrm>
+          <a:prstGeom prst="rect">
+            <a:avLst/>
+          </a:prstGeom>
+          <a:solidFill>
+            <a:schemeClr val="accent1"/>
+          </a:solidFill>
+          <a:ln>
+            <a:noFill/>
+          </a:ln>
+        </p:spPr>
+        <p:style>
+          <a:lnRef idx="2">
+            <a:schemeClr val="accent1">
+              <a:shade val="50000"/>
+            </a:schemeClr>
+          </a:lnRef>
+          <a:fillRef idx="1">
+            <a:schemeClr val="accent1"/>
+          </a:fillRef>
+          <a:effectRef idx="0">
+            <a:schemeClr val="accent1"/>
+          </a:effectRef>
+          <a:fontRef idx="minor">
+            <a:schemeClr val="lt1"/>
+          </a:fontRef>
+        </p:style>
+        <p:txBody>
+          <a:bodyPr rtlCol="0" anchor="ctr"/>
+          <a:lstStyle/>
+          <a:p>
+            <a:pPr algn="ctr"/>
+            <a:endParaRPr lang="en-US"/>
+          </a:p>
+        </p:txBody>
+      </p:sp>
+      <p:sp>
+        <p:nvSpPr>
+          <p:cNvPr id="38" name="Arrow: Pentagon 37">
+            <a:extLst>
+              <a:ext uri="{FF2B5EF4-FFF2-40B4-BE49-F238E27FC236}">
+                <a16:creationId xmlns:a16="http://schemas.microsoft.com/office/drawing/2014/main" id="{9787AEAF-CECE-47AD-BC55-6A8FA3B19CEE}"/>
+              </a:ext>
+            </a:extLst>
+          </p:cNvPr>
+          <p:cNvSpPr/>
+          <p:nvPr userDrawn="1"/>
+        </p:nvSpPr>
+        <p:spPr>
+          <a:xfrm flipH="1">
+            <a:off x="5511800" y="-6"/>
+            <a:ext cx="6680196" cy="6877110"/>
+          </a:xfrm>
+          <a:prstGeom prst="homePlate">
+            <a:avLst>
+              <a:gd name="adj" fmla="val 26731"/>
+            </a:avLst>
+          </a:prstGeom>
+          <a:solidFill>
+            <a:schemeClr val="accent4"/>
+          </a:solidFill>
+          <a:ln>
+            <a:noFill/>
+          </a:ln>
+          <a:effectLst>
+            <a:outerShdw blurRad="266700" dist="38100" dir="10800000" algn="r" rotWithShape="0">
+              <a:prstClr val="black">
+                <a:alpha val="77000"/>
+              </a:prstClr>
+            </a:outerShdw>
+          </a:effectLst>
+        </p:spPr>
+        <p:style>
+          <a:lnRef idx="2">
+            <a:schemeClr val="accent1">
+              <a:shade val="50000"/>
+            </a:schemeClr>
+          </a:lnRef>
+          <a:fillRef idx="1">
+            <a:schemeClr val="accent1"/>
+          </a:fillRef>
+          <a:effectRef idx="0">
+            <a:schemeClr val="accent1"/>
+          </a:effectRef>
+          <a:fontRef idx="minor">
+            <a:schemeClr val="lt1"/>
+          </a:fontRef>
+        </p:style>
+        <p:txBody>
+          <a:bodyPr rtlCol="0" anchor="ctr"/>
+          <a:lstStyle/>
+          <a:p>
+            <a:pPr algn="ctr"/>
+            <a:endParaRPr lang="en-US"/>
+          </a:p>
+        </p:txBody>
+      </p:sp>
+    </p:spTree>
+    <p:extLst>
+      <p:ext uri="{BB962C8B-B14F-4D97-AF65-F5344CB8AC3E}">
+        <p14:creationId xmlns:p14="http://schemas.microsoft.com/office/powerpoint/2010/main" val="3501480314"/>
       </p:ext>
     </p:extLst>
   </p:cSld>
@@ -1991,7 +2124,7 @@
 </p:sldLayout>
 </file>
 
-<file path=ppt/slideLayouts/slideLayout10.xml><?xml version="1.0" encoding="utf-8"?>
+<file path=ppt/slideLayouts/slideLayout3.xml><?xml version="1.0" encoding="utf-8"?>
 <p:sldLayout xmlns:a="http://schemas.openxmlformats.org/drawingml/2006/main" xmlns:r="http://schemas.openxmlformats.org/officeDocument/2006/relationships" xmlns:p="http://schemas.openxmlformats.org/presentationml/2006/main" matchingName="Blank" type="blank">
   <p:cSld name="Blank">
     <p:spTree>
@@ -2624,7 +2757,7 @@
 </p:sldLayout>
 </file>
 
-<file path=ppt/slideLayouts/slideLayout2.xml><?xml version="1.0" encoding="utf-8"?>
+<file path=ppt/slideLayouts/slideLayout4.xml><?xml version="1.0" encoding="utf-8"?>
 <p:sldLayout xmlns:a="http://schemas.openxmlformats.org/drawingml/2006/main" xmlns:r="http://schemas.openxmlformats.org/officeDocument/2006/relationships" xmlns:p="http://schemas.openxmlformats.org/presentationml/2006/main" preserve="1" userDrawn="1">
   <p:cSld name="6_Title Slide">
     <p:spTree>
@@ -2754,216 +2887,12 @@
           </a:p>
         </p:txBody>
       </p:sp>
-      <p:sp>
-        <p:nvSpPr>
-          <p:cNvPr id="6" name="TextBox 5">
+      <p:pic>
+        <p:nvPicPr>
+          <p:cNvPr id="11" name="Picture 10" descr="A logo with text on it&#10;&#10;Description automatically generated">
             <a:extLst>
               <a:ext uri="{FF2B5EF4-FFF2-40B4-BE49-F238E27FC236}">
-                <a16:creationId xmlns:a16="http://schemas.microsoft.com/office/drawing/2014/main" id="{52E4E2B9-ADBD-40B7-BB28-46FFE040B61C}"/>
-              </a:ext>
-            </a:extLst>
-          </p:cNvPr>
-          <p:cNvSpPr txBox="1"/>
-          <p:nvPr userDrawn="1"/>
-        </p:nvSpPr>
-        <p:spPr>
-          <a:xfrm flipH="1">
-            <a:off x="5820012" y="3184575"/>
-            <a:ext cx="1390988" cy="584775"/>
-          </a:xfrm>
-          <a:prstGeom prst="rect">
-            <a:avLst/>
-          </a:prstGeom>
-          <a:noFill/>
-        </p:spPr>
-        <p:txBody>
-          <a:bodyPr wrap="square" rtlCol="0">
-            <a:spAutoFit/>
-          </a:bodyPr>
-          <a:lstStyle/>
-          <a:p>
-            <a:r>
-              <a:rPr lang="en-US" sz="1600" b="1" dirty="0">
-                <a:solidFill>
-                  <a:schemeClr val="tx1"/>
-                </a:solidFill>
-                <a:latin typeface="+mj-lt"/>
-                <a:cs typeface="Aharoni" panose="02010803020104030203" pitchFamily="2" charset="-79"/>
-              </a:rPr>
-              <a:t>Partnering</a:t>
-            </a:r>
-            <a:br>
-              <a:rPr lang="en-US" sz="1600" b="1" dirty="0">
-                <a:solidFill>
-                  <a:schemeClr val="tx1"/>
-                </a:solidFill>
-                <a:latin typeface="+mj-lt"/>
-                <a:cs typeface="Aharoni" panose="02010803020104030203" pitchFamily="2" charset="-79"/>
-              </a:rPr>
-            </a:br>
-            <a:r>
-              <a:rPr lang="en-US" sz="1600" b="1" dirty="0">
-                <a:solidFill>
-                  <a:schemeClr val="tx1"/>
-                </a:solidFill>
-                <a:latin typeface="+mj-lt"/>
-                <a:cs typeface="Aharoni" panose="02010803020104030203" pitchFamily="2" charset="-79"/>
-              </a:rPr>
-              <a:t>Institutions</a:t>
-            </a:r>
-            <a:endParaRPr lang="en-US" sz="500" b="1" dirty="0">
-              <a:solidFill>
-                <a:schemeClr val="tx1"/>
-              </a:solidFill>
-              <a:latin typeface="+mj-lt"/>
-              <a:cs typeface="Aharoni" panose="02010803020104030203" pitchFamily="2" charset="-79"/>
-            </a:endParaRPr>
-          </a:p>
-        </p:txBody>
-      </p:sp>
-      <p:grpSp>
-        <p:nvGrpSpPr>
-          <p:cNvPr id="26" name="Group 25">
-            <a:extLst>
-              <a:ext uri="{FF2B5EF4-FFF2-40B4-BE49-F238E27FC236}">
-                <a16:creationId xmlns:a16="http://schemas.microsoft.com/office/drawing/2014/main" id="{20CB8E11-39A4-4E1E-A579-F3F237CFBB48}"/>
-              </a:ext>
-            </a:extLst>
-          </p:cNvPr>
-          <p:cNvGrpSpPr/>
-          <p:nvPr userDrawn="1"/>
-        </p:nvGrpSpPr>
-        <p:grpSpPr>
-          <a:xfrm>
-            <a:off x="7211001" y="0"/>
-            <a:ext cx="4980999" cy="6872041"/>
-            <a:chOff x="7210999" y="-376519"/>
-            <a:chExt cx="4981000" cy="6816521"/>
-          </a:xfrm>
-        </p:grpSpPr>
-        <p:grpSp>
-          <p:nvGrpSpPr>
-            <p:cNvPr id="22" name="Group 21">
-              <a:extLst>
-                <a:ext uri="{FF2B5EF4-FFF2-40B4-BE49-F238E27FC236}">
-                  <a16:creationId xmlns:a16="http://schemas.microsoft.com/office/drawing/2014/main" id="{553FEB1D-953F-4AD5-979E-64A2E1BFFAA3}"/>
-                </a:ext>
-              </a:extLst>
-            </p:cNvPr>
-            <p:cNvGrpSpPr/>
-            <p:nvPr userDrawn="1"/>
-          </p:nvGrpSpPr>
-          <p:grpSpPr>
-            <a:xfrm>
-              <a:off x="7210999" y="-376519"/>
-              <a:ext cx="4981000" cy="6242350"/>
-              <a:chOff x="7210999" y="-19320"/>
-              <a:chExt cx="4981000" cy="6242350"/>
-            </a:xfrm>
-          </p:grpSpPr>
-          <p:pic>
-            <p:nvPicPr>
-              <p:cNvPr id="9" name="Picture 8">
-                <a:extLst>
-                  <a:ext uri="{FF2B5EF4-FFF2-40B4-BE49-F238E27FC236}">
-                    <a16:creationId xmlns:a16="http://schemas.microsoft.com/office/drawing/2014/main" id="{B8A9B711-267A-4825-AFA4-306D33323A56}"/>
-                  </a:ext>
-                </a:extLst>
-              </p:cNvPr>
-              <p:cNvPicPr/>
-              <p:nvPr/>
-            </p:nvPicPr>
-            <p:blipFill rotWithShape="1">
-              <a:blip r:embed="rId2">
-                <a:extLst>
-                  <a:ext uri="{28A0092B-C50C-407E-A947-70E740481C1C}">
-                    <a14:useLocalDpi xmlns:a14="http://schemas.microsoft.com/office/drawing/2010/main" val="0"/>
-                  </a:ext>
-                </a:extLst>
-              </a:blip>
-              <a:srcRect b="3956"/>
-              <a:stretch/>
-            </p:blipFill>
-            <p:spPr bwMode="auto">
-              <a:xfrm>
-                <a:off x="7211001" y="1204009"/>
-                <a:ext cx="4980990" cy="5019021"/>
-              </a:xfrm>
-              <a:prstGeom prst="rect">
-                <a:avLst/>
-              </a:prstGeom>
-              <a:noFill/>
-              <a:ln>
-                <a:noFill/>
-              </a:ln>
-            </p:spPr>
-          </p:pic>
-          <p:pic>
-            <p:nvPicPr>
-              <p:cNvPr id="12" name="Picture 11">
-                <a:extLst>
-                  <a:ext uri="{FF2B5EF4-FFF2-40B4-BE49-F238E27FC236}">
-                    <a16:creationId xmlns:a16="http://schemas.microsoft.com/office/drawing/2014/main" id="{FDAB62FA-DA2E-47A7-B719-956966448716}"/>
-                  </a:ext>
-                </a:extLst>
-              </p:cNvPr>
-              <p:cNvPicPr>
-                <a:picLocks noChangeAspect="1"/>
-              </p:cNvPicPr>
-              <p:nvPr userDrawn="1"/>
-            </p:nvPicPr>
-            <p:blipFill rotWithShape="1">
-              <a:blip r:embed="rId3"/>
-              <a:srcRect t="8596" b="17335"/>
-              <a:stretch/>
-            </p:blipFill>
-            <p:spPr>
-              <a:xfrm>
-                <a:off x="7210999" y="-19320"/>
-                <a:ext cx="4981000" cy="1223329"/>
-              </a:xfrm>
-              <a:prstGeom prst="rect">
-                <a:avLst/>
-              </a:prstGeom>
-            </p:spPr>
-          </p:pic>
-        </p:grpSp>
-        <p:pic>
-          <p:nvPicPr>
-            <p:cNvPr id="24" name="Picture 23">
-              <a:extLst>
-                <a:ext uri="{FF2B5EF4-FFF2-40B4-BE49-F238E27FC236}">
-                  <a16:creationId xmlns:a16="http://schemas.microsoft.com/office/drawing/2014/main" id="{9B7456BD-03D3-41B8-957B-38CB1512A39A}"/>
-                </a:ext>
-              </a:extLst>
-            </p:cNvPr>
-            <p:cNvPicPr>
-              <a:picLocks noChangeAspect="1"/>
-            </p:cNvPicPr>
-            <p:nvPr userDrawn="1"/>
-          </p:nvPicPr>
-          <p:blipFill rotWithShape="1">
-            <a:blip r:embed="rId4"/>
-            <a:srcRect l="92684" t="16179" b="22966"/>
-            <a:stretch/>
-          </p:blipFill>
-          <p:spPr>
-            <a:xfrm>
-              <a:off x="11818960" y="5850942"/>
-              <a:ext cx="364397" cy="589060"/>
-            </a:xfrm>
-            <a:prstGeom prst="rect">
-              <a:avLst/>
-            </a:prstGeom>
-          </p:spPr>
-        </p:pic>
-      </p:grpSp>
-      <p:pic>
-        <p:nvPicPr>
-          <p:cNvPr id="7" name="Picture 6">
-            <a:extLst>
-              <a:ext uri="{FF2B5EF4-FFF2-40B4-BE49-F238E27FC236}">
-                <a16:creationId xmlns:a16="http://schemas.microsoft.com/office/drawing/2014/main" id="{257237D6-3BC4-49E6-A079-9EF58A6B17EA}"/>
+                <a16:creationId xmlns:a16="http://schemas.microsoft.com/office/drawing/2014/main" id="{DA5190D6-8A8D-455C-8A30-34F03DA5CC9E}"/>
               </a:ext>
             </a:extLst>
           </p:cNvPr>
@@ -2972,15 +2901,22 @@
           </p:cNvPicPr>
           <p:nvPr userDrawn="1"/>
         </p:nvPicPr>
-        <p:blipFill rotWithShape="1">
-          <a:blip r:embed="rId5"/>
-          <a:srcRect t="29710" b="25953"/>
-          <a:stretch/>
+        <p:blipFill>
+          <a:blip r:embed="rId2">
+            <a:extLst>
+              <a:ext uri="{28A0092B-C50C-407E-A947-70E740481C1C}">
+                <a14:useLocalDpi xmlns:a14="http://schemas.microsoft.com/office/drawing/2010/main" val="0"/>
+              </a:ext>
+            </a:extLst>
+          </a:blip>
+          <a:stretch>
+            <a:fillRect/>
+          </a:stretch>
         </p:blipFill>
         <p:spPr>
           <a:xfrm>
-            <a:off x="7210999" y="6276829"/>
-            <a:ext cx="4727891" cy="598922"/>
+            <a:off x="7576762" y="2617384"/>
+            <a:ext cx="3429000" cy="1304925"/>
           </a:xfrm>
           <a:prstGeom prst="rect">
             <a:avLst/>
@@ -2990,1335 +2926,7 @@
     </p:spTree>
     <p:extLst>
       <p:ext uri="{BB962C8B-B14F-4D97-AF65-F5344CB8AC3E}">
-        <p14:creationId xmlns:p14="http://schemas.microsoft.com/office/powerpoint/2010/main" val="2924746223"/>
-      </p:ext>
-    </p:extLst>
-  </p:cSld>
-  <p:clrMapOvr>
-    <a:masterClrMapping/>
-  </p:clrMapOvr>
-</p:sldLayout>
-</file>
-
-<file path=ppt/slideLayouts/slideLayout3.xml><?xml version="1.0" encoding="utf-8"?>
-<p:sldLayout xmlns:a="http://schemas.openxmlformats.org/drawingml/2006/main" xmlns:r="http://schemas.openxmlformats.org/officeDocument/2006/relationships" xmlns:p="http://schemas.openxmlformats.org/presentationml/2006/main" type="obj" preserve="1">
-  <p:cSld name="Title and Content">
-    <p:spTree>
-      <p:nvGrpSpPr>
-        <p:cNvPr id="1" name=""/>
-        <p:cNvGrpSpPr/>
-        <p:nvPr/>
-      </p:nvGrpSpPr>
-      <p:grpSpPr>
-        <a:xfrm>
-          <a:off x="0" y="0"/>
-          <a:ext cx="0" cy="0"/>
-          <a:chOff x="0" y="0"/>
-          <a:chExt cx="0" cy="0"/>
-        </a:xfrm>
-      </p:grpSpPr>
-      <p:graphicFrame>
-        <p:nvGraphicFramePr>
-          <p:cNvPr id="6" name="Object 5" hidden="1">
-            <a:extLst>
-              <a:ext uri="{FF2B5EF4-FFF2-40B4-BE49-F238E27FC236}">
-                <a16:creationId xmlns:a16="http://schemas.microsoft.com/office/drawing/2014/main" id="{262DE44B-329D-44C4-A098-54D67821F0BF}"/>
-              </a:ext>
-            </a:extLst>
-          </p:cNvPr>
-          <p:cNvGraphicFramePr>
-            <a:graphicFrameLocks noChangeAspect="1"/>
-          </p:cNvGraphicFramePr>
-          <p:nvPr userDrawn="1">
-            <p:custDataLst>
-              <p:tags r:id="rId1"/>
-            </p:custDataLst>
-          </p:nvPr>
-        </p:nvGraphicFramePr>
-        <p:xfrm>
-          <a:off x="1588" y="1588"/>
-          <a:ext cx="1587" cy="1587"/>
-        </p:xfrm>
-        <a:graphic>
-          <a:graphicData uri="http://schemas.openxmlformats.org/presentationml/2006/ole">
-            <mc:AlternateContent xmlns:mc="http://schemas.openxmlformats.org/markup-compatibility/2006">
-              <mc:Choice xmlns:v="urn:schemas-microsoft-com:vml" Requires="v">
-                <p:oleObj name="think-cell Slide" r:id="rId3" imgW="347" imgH="348" progId="TCLayout.ActiveDocument.1">
-                  <p:embed/>
-                </p:oleObj>
-              </mc:Choice>
-              <mc:Fallback>
-                <p:oleObj name="think-cell Slide" r:id="rId3" imgW="347" imgH="348" progId="TCLayout.ActiveDocument.1">
-                  <p:embed/>
-                  <p:pic>
-                    <p:nvPicPr>
-                      <p:cNvPr id="6" name="Object 5" hidden="1">
-                        <a:extLst>
-                          <a:ext uri="{FF2B5EF4-FFF2-40B4-BE49-F238E27FC236}">
-                            <a16:creationId xmlns:a16="http://schemas.microsoft.com/office/drawing/2014/main" id="{262DE44B-329D-44C4-A098-54D67821F0BF}"/>
-                          </a:ext>
-                        </a:extLst>
-                      </p:cNvPr>
-                      <p:cNvPicPr/>
-                      <p:nvPr/>
-                    </p:nvPicPr>
-                    <p:blipFill>
-                      <a:blip r:embed="rId4"/>
-                      <a:stretch>
-                        <a:fillRect/>
-                      </a:stretch>
-                    </p:blipFill>
-                    <p:spPr>
-                      <a:xfrm>
-                        <a:off x="1588" y="1588"/>
-                        <a:ext cx="1587" cy="1587"/>
-                      </a:xfrm>
-                      <a:prstGeom prst="rect">
-                        <a:avLst/>
-                      </a:prstGeom>
-                    </p:spPr>
-                  </p:pic>
-                </p:oleObj>
-              </mc:Fallback>
-            </mc:AlternateContent>
-          </a:graphicData>
-        </a:graphic>
-      </p:graphicFrame>
-      <p:sp>
-        <p:nvSpPr>
-          <p:cNvPr id="2" name="Title 1">
-            <a:extLst>
-              <a:ext uri="{FF2B5EF4-FFF2-40B4-BE49-F238E27FC236}">
-                <a16:creationId xmlns:a16="http://schemas.microsoft.com/office/drawing/2014/main" id="{5149EF36-F9CE-4647-B169-9B37B99036E8}"/>
-              </a:ext>
-            </a:extLst>
-          </p:cNvPr>
-          <p:cNvSpPr>
-            <a:spLocks noGrp="1"/>
-          </p:cNvSpPr>
-          <p:nvPr>
-            <p:ph type="title"/>
-          </p:nvPr>
-        </p:nvSpPr>
-        <p:spPr>
-          <a:xfrm>
-            <a:off x="324416" y="303636"/>
-            <a:ext cx="10470584" cy="403187"/>
-          </a:xfrm>
-        </p:spPr>
-        <p:txBody>
-          <a:bodyPr/>
-          <a:lstStyle/>
-          <a:p>
-            <a:r>
-              <a:rPr lang="en-US"/>
-              <a:t>Click to edit Master title style</a:t>
-            </a:r>
-          </a:p>
-        </p:txBody>
-      </p:sp>
-      <p:sp>
-        <p:nvSpPr>
-          <p:cNvPr id="3" name="Content Placeholder 2">
-            <a:extLst>
-              <a:ext uri="{FF2B5EF4-FFF2-40B4-BE49-F238E27FC236}">
-                <a16:creationId xmlns:a16="http://schemas.microsoft.com/office/drawing/2014/main" id="{2B1099A3-25D1-44D2-B255-78F583BF08A3}"/>
-              </a:ext>
-            </a:extLst>
-          </p:cNvPr>
-          <p:cNvSpPr>
-            <a:spLocks noGrp="1"/>
-          </p:cNvSpPr>
-          <p:nvPr>
-            <p:ph idx="1"/>
-          </p:nvPr>
-        </p:nvSpPr>
-        <p:spPr/>
-        <p:txBody>
-          <a:bodyPr/>
-          <a:lstStyle/>
-          <a:p>
-            <a:pPr lvl="0"/>
-            <a:r>
-              <a:rPr lang="en-US"/>
-              <a:t>Edit Master text styles</a:t>
-            </a:r>
-          </a:p>
-          <a:p>
-            <a:pPr lvl="1"/>
-            <a:r>
-              <a:rPr lang="en-US"/>
-              <a:t>Second level</a:t>
-            </a:r>
-          </a:p>
-          <a:p>
-            <a:pPr lvl="2"/>
-            <a:r>
-              <a:rPr lang="en-US"/>
-              <a:t>Third level</a:t>
-            </a:r>
-          </a:p>
-          <a:p>
-            <a:pPr lvl="3"/>
-            <a:r>
-              <a:rPr lang="en-US"/>
-              <a:t>Fourth level</a:t>
-            </a:r>
-          </a:p>
-        </p:txBody>
-      </p:sp>
-      <p:sp>
-        <p:nvSpPr>
-          <p:cNvPr id="4" name="Date Placeholder 3">
-            <a:extLst>
-              <a:ext uri="{FF2B5EF4-FFF2-40B4-BE49-F238E27FC236}">
-                <a16:creationId xmlns:a16="http://schemas.microsoft.com/office/drawing/2014/main" id="{4385C4C7-F6B0-48E4-ACEC-649CC0F49C64}"/>
-              </a:ext>
-            </a:extLst>
-          </p:cNvPr>
-          <p:cNvSpPr>
-            <a:spLocks noGrp="1"/>
-          </p:cNvSpPr>
-          <p:nvPr>
-            <p:ph type="dt" sz="half" idx="10"/>
-          </p:nvPr>
-        </p:nvSpPr>
-        <p:spPr/>
-        <p:txBody>
-          <a:bodyPr/>
-          <a:lstStyle/>
-          <a:p>
-            <a:fld id="{C426BC5F-09C1-43F9-92E4-3807667E7453}" type="datetimeFigureOut">
-              <a:rPr lang="en-US" smtClean="0"/>
-              <a:t>29-Aug-21</a:t>
-            </a:fld>
-            <a:endParaRPr lang="en-US" dirty="0"/>
-          </a:p>
-        </p:txBody>
-      </p:sp>
-      <p:sp>
-        <p:nvSpPr>
-          <p:cNvPr id="5" name="Footer Placeholder 4">
-            <a:extLst>
-              <a:ext uri="{FF2B5EF4-FFF2-40B4-BE49-F238E27FC236}">
-                <a16:creationId xmlns:a16="http://schemas.microsoft.com/office/drawing/2014/main" id="{ECDAD504-107D-4E14-8686-4209B335C8D1}"/>
-              </a:ext>
-            </a:extLst>
-          </p:cNvPr>
-          <p:cNvSpPr>
-            <a:spLocks noGrp="1"/>
-          </p:cNvSpPr>
-          <p:nvPr>
-            <p:ph type="ftr" sz="quarter" idx="11"/>
-          </p:nvPr>
-        </p:nvSpPr>
-        <p:spPr/>
-        <p:txBody>
-          <a:bodyPr/>
-          <a:lstStyle/>
-          <a:p>
-            <a:endParaRPr lang="en-US"/>
-          </a:p>
-        </p:txBody>
-      </p:sp>
-    </p:spTree>
-    <p:extLst>
-      <p:ext uri="{BB962C8B-B14F-4D97-AF65-F5344CB8AC3E}">
-        <p14:creationId xmlns:p14="http://schemas.microsoft.com/office/powerpoint/2010/main" val="1362967565"/>
-      </p:ext>
-    </p:extLst>
-  </p:cSld>
-  <p:clrMapOvr>
-    <a:masterClrMapping/>
-  </p:clrMapOvr>
-</p:sldLayout>
-</file>
-
-<file path=ppt/slideLayouts/slideLayout4.xml><?xml version="1.0" encoding="utf-8"?>
-<p:sldLayout xmlns:a="http://schemas.openxmlformats.org/drawingml/2006/main" xmlns:r="http://schemas.openxmlformats.org/officeDocument/2006/relationships" xmlns:p="http://schemas.openxmlformats.org/presentationml/2006/main" userDrawn="1">
-  <p:cSld name="Helium_Break">
-    <p:spTree>
-      <p:nvGrpSpPr>
-        <p:cNvPr id="1" name=""/>
-        <p:cNvGrpSpPr/>
-        <p:nvPr/>
-      </p:nvGrpSpPr>
-      <p:grpSpPr>
-        <a:xfrm>
-          <a:off x="0" y="0"/>
-          <a:ext cx="0" cy="0"/>
-          <a:chOff x="0" y="0"/>
-          <a:chExt cx="0" cy="0"/>
-        </a:xfrm>
-      </p:grpSpPr>
-      <p:sp>
-        <p:nvSpPr>
-          <p:cNvPr id="3" name="Rectangle 2"/>
-          <p:cNvSpPr/>
-          <p:nvPr userDrawn="1"/>
-        </p:nvSpPr>
-        <p:spPr>
-          <a:xfrm>
-            <a:off x="3871384" y="6267451"/>
-            <a:ext cx="4080933" cy="500063"/>
-          </a:xfrm>
-          <a:prstGeom prst="rect">
-            <a:avLst/>
-          </a:prstGeom>
-          <a:solidFill>
-            <a:schemeClr val="bg2"/>
-          </a:solidFill>
-          <a:ln>
-            <a:noFill/>
-          </a:ln>
-        </p:spPr>
-        <p:style>
-          <a:lnRef idx="2">
-            <a:schemeClr val="accent1">
-              <a:shade val="50000"/>
-            </a:schemeClr>
-          </a:lnRef>
-          <a:fillRef idx="1">
-            <a:schemeClr val="accent1"/>
-          </a:fillRef>
-          <a:effectRef idx="0">
-            <a:schemeClr val="accent1"/>
-          </a:effectRef>
-          <a:fontRef idx="minor">
-            <a:schemeClr val="lt1"/>
-          </a:fontRef>
-        </p:style>
-        <p:txBody>
-          <a:bodyPr anchor="ctr"/>
-          <a:lstStyle/>
-          <a:p>
-            <a:pPr algn="ctr" eaLnBrk="1" fontAlgn="auto" hangingPunct="1">
-              <a:spcBef>
-                <a:spcPts val="0"/>
-              </a:spcBef>
-              <a:spcAft>
-                <a:spcPts val="0"/>
-              </a:spcAft>
-              <a:defRPr/>
-            </a:pPr>
-            <a:endParaRPr lang="en-US" sz="675">
-              <a:solidFill>
-                <a:prstClr val="white"/>
-              </a:solidFill>
-            </a:endParaRPr>
-          </a:p>
-        </p:txBody>
-      </p:sp>
-      <p:sp>
-        <p:nvSpPr>
-          <p:cNvPr id="22" name="Picture Placeholder 21"/>
-          <p:cNvSpPr>
-            <a:spLocks noGrp="1"/>
-          </p:cNvSpPr>
-          <p:nvPr>
-            <p:ph type="pic" sz="quarter" idx="14"/>
-          </p:nvPr>
-        </p:nvSpPr>
-        <p:spPr>
-          <a:xfrm>
-            <a:off x="6735517" y="22304"/>
-            <a:ext cx="5545843" cy="6745671"/>
-          </a:xfrm>
-          <a:custGeom>
-            <a:avLst/>
-            <a:gdLst>
-              <a:gd name="connsiteX0" fmla="*/ 490691 w 11088796"/>
-              <a:gd name="connsiteY0" fmla="*/ 11756903 h 13491341"/>
-              <a:gd name="connsiteX1" fmla="*/ 733817 w 11088796"/>
-              <a:gd name="connsiteY1" fmla="*/ 11837830 h 13491341"/>
-              <a:gd name="connsiteX2" fmla="*/ 1808437 w 11088796"/>
-              <a:gd name="connsiteY2" fmla="*/ 12656501 h 13491341"/>
-              <a:gd name="connsiteX3" fmla="*/ 1856663 w 11088796"/>
-              <a:gd name="connsiteY3" fmla="*/ 13306044 h 13491341"/>
-              <a:gd name="connsiteX4" fmla="*/ 1236430 w 11088796"/>
-              <a:gd name="connsiteY4" fmla="*/ 13407341 h 13491341"/>
-              <a:gd name="connsiteX5" fmla="*/ 161810 w 11088796"/>
-              <a:gd name="connsiteY5" fmla="*/ 12588671 h 13491341"/>
-              <a:gd name="connsiteX6" fmla="*/ 97910 w 11088796"/>
-              <a:gd name="connsiteY6" fmla="*/ 11966183 h 13491341"/>
-              <a:gd name="connsiteX7" fmla="*/ 490691 w 11088796"/>
-              <a:gd name="connsiteY7" fmla="*/ 11756903 h 13491341"/>
-              <a:gd name="connsiteX8" fmla="*/ 1287637 w 11088796"/>
-              <a:gd name="connsiteY8" fmla="*/ 10710803 h 13491341"/>
-              <a:gd name="connsiteX9" fmla="*/ 1523741 w 11088796"/>
-              <a:gd name="connsiteY9" fmla="*/ 10800947 h 13491341"/>
-              <a:gd name="connsiteX10" fmla="*/ 2598361 w 11088796"/>
-              <a:gd name="connsiteY10" fmla="*/ 11619618 h 13491341"/>
-              <a:gd name="connsiteX11" fmla="*/ 2667707 w 11088796"/>
-              <a:gd name="connsiteY11" fmla="*/ 12241437 h 13491341"/>
-              <a:gd name="connsiteX12" fmla="*/ 2049794 w 11088796"/>
-              <a:gd name="connsiteY12" fmla="*/ 12339687 h 13491341"/>
-              <a:gd name="connsiteX13" fmla="*/ 975175 w 11088796"/>
-              <a:gd name="connsiteY13" fmla="*/ 11521017 h 13491341"/>
-              <a:gd name="connsiteX14" fmla="*/ 908953 w 11088796"/>
-              <a:gd name="connsiteY14" fmla="*/ 10901578 h 13491341"/>
-              <a:gd name="connsiteX15" fmla="*/ 1287637 w 11088796"/>
-              <a:gd name="connsiteY15" fmla="*/ 10710803 h 13491341"/>
-              <a:gd name="connsiteX16" fmla="*/ 1721569 w 11088796"/>
-              <a:gd name="connsiteY16" fmla="*/ 9334566 h 13491341"/>
-              <a:gd name="connsiteX17" fmla="*/ 1947183 w 11088796"/>
-              <a:gd name="connsiteY17" fmla="*/ 9405678 h 13491341"/>
-              <a:gd name="connsiteX18" fmla="*/ 3834230 w 11088796"/>
-              <a:gd name="connsiteY18" fmla="*/ 10843275 h 13491341"/>
-              <a:gd name="connsiteX19" fmla="*/ 3878894 w 11088796"/>
-              <a:gd name="connsiteY19" fmla="*/ 11451101 h 13491341"/>
-              <a:gd name="connsiteX20" fmla="*/ 3262230 w 11088796"/>
-              <a:gd name="connsiteY20" fmla="*/ 11594106 h 13491341"/>
-              <a:gd name="connsiteX21" fmla="*/ 1375183 w 11088796"/>
-              <a:gd name="connsiteY21" fmla="*/ 10156508 h 13491341"/>
-              <a:gd name="connsiteX22" fmla="*/ 1349316 w 11088796"/>
-              <a:gd name="connsiteY22" fmla="*/ 9524008 h 13491341"/>
-              <a:gd name="connsiteX23" fmla="*/ 1721569 w 11088796"/>
-              <a:gd name="connsiteY23" fmla="*/ 9334566 h 13491341"/>
-              <a:gd name="connsiteX24" fmla="*/ 2101387 w 11088796"/>
-              <a:gd name="connsiteY24" fmla="*/ 7936576 h 13491341"/>
-              <a:gd name="connsiteX25" fmla="*/ 2344041 w 11088796"/>
-              <a:gd name="connsiteY25" fmla="*/ 8020670 h 13491341"/>
-              <a:gd name="connsiteX26" fmla="*/ 5052676 w 11088796"/>
-              <a:gd name="connsiteY26" fmla="*/ 10084172 h 13491341"/>
-              <a:gd name="connsiteX27" fmla="*/ 5120124 w 11088796"/>
-              <a:gd name="connsiteY27" fmla="*/ 10709361 h 13491341"/>
-              <a:gd name="connsiteX28" fmla="*/ 4480668 w 11088796"/>
-              <a:gd name="connsiteY28" fmla="*/ 10835011 h 13491341"/>
-              <a:gd name="connsiteX29" fmla="*/ 1772034 w 11088796"/>
-              <a:gd name="connsiteY29" fmla="*/ 8771509 h 13491341"/>
-              <a:gd name="connsiteX30" fmla="*/ 1723383 w 11088796"/>
-              <a:gd name="connsiteY30" fmla="*/ 8121644 h 13491341"/>
-              <a:gd name="connsiteX31" fmla="*/ 2101387 w 11088796"/>
-              <a:gd name="connsiteY31" fmla="*/ 7936576 h 13491341"/>
-              <a:gd name="connsiteX32" fmla="*/ 1945410 w 11088796"/>
-              <a:gd name="connsiteY32" fmla="*/ 6115309 h 13491341"/>
-              <a:gd name="connsiteX33" fmla="*/ 2188908 w 11088796"/>
-              <a:gd name="connsiteY33" fmla="*/ 6197004 h 13491341"/>
-              <a:gd name="connsiteX34" fmla="*/ 6859286 w 11088796"/>
-              <a:gd name="connsiteY34" fmla="*/ 9755006 h 13491341"/>
-              <a:gd name="connsiteX35" fmla="*/ 6889502 w 11088796"/>
-              <a:gd name="connsiteY35" fmla="*/ 10387978 h 13491341"/>
-              <a:gd name="connsiteX36" fmla="*/ 6287266 w 11088796"/>
-              <a:gd name="connsiteY36" fmla="*/ 10505862 h 13491341"/>
-              <a:gd name="connsiteX37" fmla="*/ 1616888 w 11088796"/>
-              <a:gd name="connsiteY37" fmla="*/ 6947860 h 13491341"/>
-              <a:gd name="connsiteX38" fmla="*/ 1551927 w 11088796"/>
-              <a:gd name="connsiteY38" fmla="*/ 6321692 h 13491341"/>
-              <a:gd name="connsiteX39" fmla="*/ 1945410 w 11088796"/>
-              <a:gd name="connsiteY39" fmla="*/ 6115309 h 13491341"/>
-              <a:gd name="connsiteX40" fmla="*/ 1120711 w 11088796"/>
-              <a:gd name="connsiteY40" fmla="*/ 3826332 h 13491341"/>
-              <a:gd name="connsiteX41" fmla="*/ 1362501 w 11088796"/>
-              <a:gd name="connsiteY41" fmla="*/ 3910611 h 13491341"/>
-              <a:gd name="connsiteX42" fmla="*/ 9297658 w 11088796"/>
-              <a:gd name="connsiteY42" fmla="*/ 9955798 h 13491341"/>
-              <a:gd name="connsiteX43" fmla="*/ 9344772 w 11088796"/>
-              <a:gd name="connsiteY43" fmla="*/ 10560687 h 13491341"/>
-              <a:gd name="connsiteX44" fmla="*/ 8749084 w 11088796"/>
-              <a:gd name="connsiteY44" fmla="*/ 10675877 h 13491341"/>
-              <a:gd name="connsiteX45" fmla="*/ 813928 w 11088796"/>
-              <a:gd name="connsiteY45" fmla="*/ 4630689 h 13491341"/>
-              <a:gd name="connsiteX46" fmla="*/ 744971 w 11088796"/>
-              <a:gd name="connsiteY46" fmla="*/ 4009160 h 13491341"/>
-              <a:gd name="connsiteX47" fmla="*/ 1120711 w 11088796"/>
-              <a:gd name="connsiteY47" fmla="*/ 3826332 h 13491341"/>
-              <a:gd name="connsiteX48" fmla="*/ 4227254 w 11088796"/>
-              <a:gd name="connsiteY48" fmla="*/ 2790686 h 13491341"/>
-              <a:gd name="connsiteX49" fmla="*/ 4454070 w 11088796"/>
-              <a:gd name="connsiteY49" fmla="*/ 2860658 h 13491341"/>
-              <a:gd name="connsiteX50" fmla="*/ 9475564 w 11088796"/>
-              <a:gd name="connsiteY50" fmla="*/ 6686148 h 13491341"/>
-              <a:gd name="connsiteX51" fmla="*/ 9504938 w 11088796"/>
-              <a:gd name="connsiteY51" fmla="*/ 7321320 h 13491341"/>
-              <a:gd name="connsiteX52" fmla="*/ 8903564 w 11088796"/>
-              <a:gd name="connsiteY52" fmla="*/ 7436978 h 13491341"/>
-              <a:gd name="connsiteX53" fmla="*/ 3882070 w 11088796"/>
-              <a:gd name="connsiteY53" fmla="*/ 3611488 h 13491341"/>
-              <a:gd name="connsiteX54" fmla="*/ 3837020 w 11088796"/>
-              <a:gd name="connsiteY54" fmla="*/ 3003370 h 13491341"/>
-              <a:gd name="connsiteX55" fmla="*/ 4227254 w 11088796"/>
-              <a:gd name="connsiteY55" fmla="*/ 2790686 h 13491341"/>
-              <a:gd name="connsiteX56" fmla="*/ 5978286 w 11088796"/>
-              <a:gd name="connsiteY56" fmla="*/ 2454748 h 13491341"/>
-              <a:gd name="connsiteX57" fmla="*/ 6213830 w 11088796"/>
-              <a:gd name="connsiteY57" fmla="*/ 2544466 h 13491341"/>
-              <a:gd name="connsiteX58" fmla="*/ 9303674 w 11088796"/>
-              <a:gd name="connsiteY58" fmla="*/ 4898383 h 13491341"/>
-              <a:gd name="connsiteX59" fmla="*/ 9350860 w 11088796"/>
-              <a:gd name="connsiteY59" fmla="*/ 5503319 h 13491341"/>
-              <a:gd name="connsiteX60" fmla="*/ 8755108 w 11088796"/>
-              <a:gd name="connsiteY60" fmla="*/ 5618451 h 13491341"/>
-              <a:gd name="connsiteX61" fmla="*/ 5665264 w 11088796"/>
-              <a:gd name="connsiteY61" fmla="*/ 3264535 h 13491341"/>
-              <a:gd name="connsiteX62" fmla="*/ 5596232 w 11088796"/>
-              <a:gd name="connsiteY62" fmla="*/ 2642955 h 13491341"/>
-              <a:gd name="connsiteX63" fmla="*/ 5978286 w 11088796"/>
-              <a:gd name="connsiteY63" fmla="*/ 2454748 h 13491341"/>
-              <a:gd name="connsiteX64" fmla="*/ 1124504 w 11088796"/>
-              <a:gd name="connsiteY64" fmla="*/ 2113497 h 13491341"/>
-              <a:gd name="connsiteX65" fmla="*/ 1366063 w 11088796"/>
-              <a:gd name="connsiteY65" fmla="*/ 2195470 h 13491341"/>
-              <a:gd name="connsiteX66" fmla="*/ 10938820 w 11088796"/>
-              <a:gd name="connsiteY66" fmla="*/ 9488219 h 13491341"/>
-              <a:gd name="connsiteX67" fmla="*/ 10982418 w 11088796"/>
-              <a:gd name="connsiteY67" fmla="*/ 10098117 h 13491341"/>
-              <a:gd name="connsiteX68" fmla="*/ 10366800 w 11088796"/>
-              <a:gd name="connsiteY68" fmla="*/ 10239076 h 13491341"/>
-              <a:gd name="connsiteX69" fmla="*/ 794043 w 11088796"/>
-              <a:gd name="connsiteY69" fmla="*/ 2946327 h 13491341"/>
-              <a:gd name="connsiteX70" fmla="*/ 744627 w 11088796"/>
-              <a:gd name="connsiteY70" fmla="*/ 2298728 h 13491341"/>
-              <a:gd name="connsiteX71" fmla="*/ 1124504 w 11088796"/>
-              <a:gd name="connsiteY71" fmla="*/ 2113497 h 13491341"/>
-              <a:gd name="connsiteX72" fmla="*/ 7356102 w 11088796"/>
-              <a:gd name="connsiteY72" fmla="*/ 1797588 h 13491341"/>
-              <a:gd name="connsiteX73" fmla="*/ 7581448 w 11088796"/>
-              <a:gd name="connsiteY73" fmla="*/ 1868497 h 13491341"/>
-              <a:gd name="connsiteX74" fmla="*/ 9593352 w 11088796"/>
-              <a:gd name="connsiteY74" fmla="*/ 3401213 h 13491341"/>
-              <a:gd name="connsiteX75" fmla="*/ 9637536 w 11088796"/>
-              <a:gd name="connsiteY75" fmla="*/ 4008670 h 13491341"/>
-              <a:gd name="connsiteX76" fmla="*/ 9021352 w 11088796"/>
-              <a:gd name="connsiteY76" fmla="*/ 4152044 h 13491341"/>
-              <a:gd name="connsiteX77" fmla="*/ 7009448 w 11088796"/>
-              <a:gd name="connsiteY77" fmla="*/ 2619328 h 13491341"/>
-              <a:gd name="connsiteX78" fmla="*/ 6984064 w 11088796"/>
-              <a:gd name="connsiteY78" fmla="*/ 1987194 h 13491341"/>
-              <a:gd name="connsiteX79" fmla="*/ 7356102 w 11088796"/>
-              <a:gd name="connsiteY79" fmla="*/ 1797588 h 13491341"/>
-              <a:gd name="connsiteX80" fmla="*/ 8626238 w 11088796"/>
-              <a:gd name="connsiteY80" fmla="*/ 1077861 h 13491341"/>
-              <a:gd name="connsiteX81" fmla="*/ 8867664 w 11088796"/>
-              <a:gd name="connsiteY81" fmla="*/ 1161018 h 13491341"/>
-              <a:gd name="connsiteX82" fmla="*/ 9942284 w 11088796"/>
-              <a:gd name="connsiteY82" fmla="*/ 1979689 h 13491341"/>
-              <a:gd name="connsiteX83" fmla="*/ 10009308 w 11088796"/>
-              <a:gd name="connsiteY83" fmla="*/ 2604557 h 13491341"/>
-              <a:gd name="connsiteX84" fmla="*/ 9370276 w 11088796"/>
-              <a:gd name="connsiteY84" fmla="*/ 2730530 h 13491341"/>
-              <a:gd name="connsiteX85" fmla="*/ 8295656 w 11088796"/>
-              <a:gd name="connsiteY85" fmla="*/ 1911858 h 13491341"/>
-              <a:gd name="connsiteX86" fmla="*/ 8250554 w 11088796"/>
-              <a:gd name="connsiteY86" fmla="*/ 1264696 h 13491341"/>
-              <a:gd name="connsiteX87" fmla="*/ 8626238 w 11088796"/>
-              <a:gd name="connsiteY87" fmla="*/ 1077861 h 13491341"/>
-              <a:gd name="connsiteX88" fmla="*/ 9447378 w 11088796"/>
-              <a:gd name="connsiteY88" fmla="*/ 1 h 13491341"/>
-              <a:gd name="connsiteX89" fmla="*/ 9689796 w 11088796"/>
-              <a:gd name="connsiteY89" fmla="*/ 81858 h 13491341"/>
-              <a:gd name="connsiteX90" fmla="*/ 10764416 w 11088796"/>
-              <a:gd name="connsiteY90" fmla="*/ 900529 h 13491341"/>
-              <a:gd name="connsiteX91" fmla="*/ 10812642 w 11088796"/>
-              <a:gd name="connsiteY91" fmla="*/ 1550070 h 13491341"/>
-              <a:gd name="connsiteX92" fmla="*/ 10192408 w 11088796"/>
-              <a:gd name="connsiteY92" fmla="*/ 1651368 h 13491341"/>
-              <a:gd name="connsiteX93" fmla="*/ 9117788 w 11088796"/>
-              <a:gd name="connsiteY93" fmla="*/ 832697 h 13491341"/>
-              <a:gd name="connsiteX94" fmla="*/ 9053888 w 11088796"/>
-              <a:gd name="connsiteY94" fmla="*/ 210211 h 13491341"/>
-              <a:gd name="connsiteX95" fmla="*/ 9447378 w 11088796"/>
-              <a:gd name="connsiteY95" fmla="*/ 1 h 13491341"/>
-            </a:gdLst>
-            <a:ahLst/>
-            <a:cxnLst>
-              <a:cxn ang="0">
-                <a:pos x="connsiteX0" y="connsiteY0"/>
-              </a:cxn>
-              <a:cxn ang="0">
-                <a:pos x="connsiteX1" y="connsiteY1"/>
-              </a:cxn>
-              <a:cxn ang="0">
-                <a:pos x="connsiteX2" y="connsiteY2"/>
-              </a:cxn>
-              <a:cxn ang="0">
-                <a:pos x="connsiteX3" y="connsiteY3"/>
-              </a:cxn>
-              <a:cxn ang="0">
-                <a:pos x="connsiteX4" y="connsiteY4"/>
-              </a:cxn>
-              <a:cxn ang="0">
-                <a:pos x="connsiteX5" y="connsiteY5"/>
-              </a:cxn>
-              <a:cxn ang="0">
-                <a:pos x="connsiteX6" y="connsiteY6"/>
-              </a:cxn>
-              <a:cxn ang="0">
-                <a:pos x="connsiteX7" y="connsiteY7"/>
-              </a:cxn>
-              <a:cxn ang="0">
-                <a:pos x="connsiteX8" y="connsiteY8"/>
-              </a:cxn>
-              <a:cxn ang="0">
-                <a:pos x="connsiteX9" y="connsiteY9"/>
-              </a:cxn>
-              <a:cxn ang="0">
-                <a:pos x="connsiteX10" y="connsiteY10"/>
-              </a:cxn>
-              <a:cxn ang="0">
-                <a:pos x="connsiteX11" y="connsiteY11"/>
-              </a:cxn>
-              <a:cxn ang="0">
-                <a:pos x="connsiteX12" y="connsiteY12"/>
-              </a:cxn>
-              <a:cxn ang="0">
-                <a:pos x="connsiteX13" y="connsiteY13"/>
-              </a:cxn>
-              <a:cxn ang="0">
-                <a:pos x="connsiteX14" y="connsiteY14"/>
-              </a:cxn>
-              <a:cxn ang="0">
-                <a:pos x="connsiteX15" y="connsiteY15"/>
-              </a:cxn>
-              <a:cxn ang="0">
-                <a:pos x="connsiteX16" y="connsiteY16"/>
-              </a:cxn>
-              <a:cxn ang="0">
-                <a:pos x="connsiteX17" y="connsiteY17"/>
-              </a:cxn>
-              <a:cxn ang="0">
-                <a:pos x="connsiteX18" y="connsiteY18"/>
-              </a:cxn>
-              <a:cxn ang="0">
-                <a:pos x="connsiteX19" y="connsiteY19"/>
-              </a:cxn>
-              <a:cxn ang="0">
-                <a:pos x="connsiteX20" y="connsiteY20"/>
-              </a:cxn>
-              <a:cxn ang="0">
-                <a:pos x="connsiteX21" y="connsiteY21"/>
-              </a:cxn>
-              <a:cxn ang="0">
-                <a:pos x="connsiteX22" y="connsiteY22"/>
-              </a:cxn>
-              <a:cxn ang="0">
-                <a:pos x="connsiteX23" y="connsiteY23"/>
-              </a:cxn>
-              <a:cxn ang="0">
-                <a:pos x="connsiteX24" y="connsiteY24"/>
-              </a:cxn>
-              <a:cxn ang="0">
-                <a:pos x="connsiteX25" y="connsiteY25"/>
-              </a:cxn>
-              <a:cxn ang="0">
-                <a:pos x="connsiteX26" y="connsiteY26"/>
-              </a:cxn>
-              <a:cxn ang="0">
-                <a:pos x="connsiteX27" y="connsiteY27"/>
-              </a:cxn>
-              <a:cxn ang="0">
-                <a:pos x="connsiteX28" y="connsiteY28"/>
-              </a:cxn>
-              <a:cxn ang="0">
-                <a:pos x="connsiteX29" y="connsiteY29"/>
-              </a:cxn>
-              <a:cxn ang="0">
-                <a:pos x="connsiteX30" y="connsiteY30"/>
-              </a:cxn>
-              <a:cxn ang="0">
-                <a:pos x="connsiteX31" y="connsiteY31"/>
-              </a:cxn>
-              <a:cxn ang="0">
-                <a:pos x="connsiteX32" y="connsiteY32"/>
-              </a:cxn>
-              <a:cxn ang="0">
-                <a:pos x="connsiteX33" y="connsiteY33"/>
-              </a:cxn>
-              <a:cxn ang="0">
-                <a:pos x="connsiteX34" y="connsiteY34"/>
-              </a:cxn>
-              <a:cxn ang="0">
-                <a:pos x="connsiteX35" y="connsiteY35"/>
-              </a:cxn>
-              <a:cxn ang="0">
-                <a:pos x="connsiteX36" y="connsiteY36"/>
-              </a:cxn>
-              <a:cxn ang="0">
-                <a:pos x="connsiteX37" y="connsiteY37"/>
-              </a:cxn>
-              <a:cxn ang="0">
-                <a:pos x="connsiteX38" y="connsiteY38"/>
-              </a:cxn>
-              <a:cxn ang="0">
-                <a:pos x="connsiteX39" y="connsiteY39"/>
-              </a:cxn>
-              <a:cxn ang="0">
-                <a:pos x="connsiteX40" y="connsiteY40"/>
-              </a:cxn>
-              <a:cxn ang="0">
-                <a:pos x="connsiteX41" y="connsiteY41"/>
-              </a:cxn>
-              <a:cxn ang="0">
-                <a:pos x="connsiteX42" y="connsiteY42"/>
-              </a:cxn>
-              <a:cxn ang="0">
-                <a:pos x="connsiteX43" y="connsiteY43"/>
-              </a:cxn>
-              <a:cxn ang="0">
-                <a:pos x="connsiteX44" y="connsiteY44"/>
-              </a:cxn>
-              <a:cxn ang="0">
-                <a:pos x="connsiteX45" y="connsiteY45"/>
-              </a:cxn>
-              <a:cxn ang="0">
-                <a:pos x="connsiteX46" y="connsiteY46"/>
-              </a:cxn>
-              <a:cxn ang="0">
-                <a:pos x="connsiteX47" y="connsiteY47"/>
-              </a:cxn>
-              <a:cxn ang="0">
-                <a:pos x="connsiteX48" y="connsiteY48"/>
-              </a:cxn>
-              <a:cxn ang="0">
-                <a:pos x="connsiteX49" y="connsiteY49"/>
-              </a:cxn>
-              <a:cxn ang="0">
-                <a:pos x="connsiteX50" y="connsiteY50"/>
-              </a:cxn>
-              <a:cxn ang="0">
-                <a:pos x="connsiteX51" y="connsiteY51"/>
-              </a:cxn>
-              <a:cxn ang="0">
-                <a:pos x="connsiteX52" y="connsiteY52"/>
-              </a:cxn>
-              <a:cxn ang="0">
-                <a:pos x="connsiteX53" y="connsiteY53"/>
-              </a:cxn>
-              <a:cxn ang="0">
-                <a:pos x="connsiteX54" y="connsiteY54"/>
-              </a:cxn>
-              <a:cxn ang="0">
-                <a:pos x="connsiteX55" y="connsiteY55"/>
-              </a:cxn>
-              <a:cxn ang="0">
-                <a:pos x="connsiteX56" y="connsiteY56"/>
-              </a:cxn>
-              <a:cxn ang="0">
-                <a:pos x="connsiteX57" y="connsiteY57"/>
-              </a:cxn>
-              <a:cxn ang="0">
-                <a:pos x="connsiteX58" y="connsiteY58"/>
-              </a:cxn>
-              <a:cxn ang="0">
-                <a:pos x="connsiteX59" y="connsiteY59"/>
-              </a:cxn>
-              <a:cxn ang="0">
-                <a:pos x="connsiteX60" y="connsiteY60"/>
-              </a:cxn>
-              <a:cxn ang="0">
-                <a:pos x="connsiteX61" y="connsiteY61"/>
-              </a:cxn>
-              <a:cxn ang="0">
-                <a:pos x="connsiteX62" y="connsiteY62"/>
-              </a:cxn>
-              <a:cxn ang="0">
-                <a:pos x="connsiteX63" y="connsiteY63"/>
-              </a:cxn>
-              <a:cxn ang="0">
-                <a:pos x="connsiteX64" y="connsiteY64"/>
-              </a:cxn>
-              <a:cxn ang="0">
-                <a:pos x="connsiteX65" y="connsiteY65"/>
-              </a:cxn>
-              <a:cxn ang="0">
-                <a:pos x="connsiteX66" y="connsiteY66"/>
-              </a:cxn>
-              <a:cxn ang="0">
-                <a:pos x="connsiteX67" y="connsiteY67"/>
-              </a:cxn>
-              <a:cxn ang="0">
-                <a:pos x="connsiteX68" y="connsiteY68"/>
-              </a:cxn>
-              <a:cxn ang="0">
-                <a:pos x="connsiteX69" y="connsiteY69"/>
-              </a:cxn>
-              <a:cxn ang="0">
-                <a:pos x="connsiteX70" y="connsiteY70"/>
-              </a:cxn>
-              <a:cxn ang="0">
-                <a:pos x="connsiteX71" y="connsiteY71"/>
-              </a:cxn>
-              <a:cxn ang="0">
-                <a:pos x="connsiteX72" y="connsiteY72"/>
-              </a:cxn>
-              <a:cxn ang="0">
-                <a:pos x="connsiteX73" y="connsiteY73"/>
-              </a:cxn>
-              <a:cxn ang="0">
-                <a:pos x="connsiteX74" y="connsiteY74"/>
-              </a:cxn>
-              <a:cxn ang="0">
-                <a:pos x="connsiteX75" y="connsiteY75"/>
-              </a:cxn>
-              <a:cxn ang="0">
-                <a:pos x="connsiteX76" y="connsiteY76"/>
-              </a:cxn>
-              <a:cxn ang="0">
-                <a:pos x="connsiteX77" y="connsiteY77"/>
-              </a:cxn>
-              <a:cxn ang="0">
-                <a:pos x="connsiteX78" y="connsiteY78"/>
-              </a:cxn>
-              <a:cxn ang="0">
-                <a:pos x="connsiteX79" y="connsiteY79"/>
-              </a:cxn>
-              <a:cxn ang="0">
-                <a:pos x="connsiteX80" y="connsiteY80"/>
-              </a:cxn>
-              <a:cxn ang="0">
-                <a:pos x="connsiteX81" y="connsiteY81"/>
-              </a:cxn>
-              <a:cxn ang="0">
-                <a:pos x="connsiteX82" y="connsiteY82"/>
-              </a:cxn>
-              <a:cxn ang="0">
-                <a:pos x="connsiteX83" y="connsiteY83"/>
-              </a:cxn>
-              <a:cxn ang="0">
-                <a:pos x="connsiteX84" y="connsiteY84"/>
-              </a:cxn>
-              <a:cxn ang="0">
-                <a:pos x="connsiteX85" y="connsiteY85"/>
-              </a:cxn>
-              <a:cxn ang="0">
-                <a:pos x="connsiteX86" y="connsiteY86"/>
-              </a:cxn>
-              <a:cxn ang="0">
-                <a:pos x="connsiteX87" y="connsiteY87"/>
-              </a:cxn>
-              <a:cxn ang="0">
-                <a:pos x="connsiteX88" y="connsiteY88"/>
-              </a:cxn>
-              <a:cxn ang="0">
-                <a:pos x="connsiteX89" y="connsiteY89"/>
-              </a:cxn>
-              <a:cxn ang="0">
-                <a:pos x="connsiteX90" y="connsiteY90"/>
-              </a:cxn>
-              <a:cxn ang="0">
-                <a:pos x="connsiteX91" y="connsiteY91"/>
-              </a:cxn>
-              <a:cxn ang="0">
-                <a:pos x="connsiteX92" y="connsiteY92"/>
-              </a:cxn>
-              <a:cxn ang="0">
-                <a:pos x="connsiteX93" y="connsiteY93"/>
-              </a:cxn>
-              <a:cxn ang="0">
-                <a:pos x="connsiteX94" y="connsiteY94"/>
-              </a:cxn>
-              <a:cxn ang="0">
-                <a:pos x="connsiteX95" y="connsiteY95"/>
-              </a:cxn>
-            </a:cxnLst>
-            <a:rect l="l" t="t" r="r" b="b"/>
-            <a:pathLst>
-              <a:path w="11088796" h="13491341">
-                <a:moveTo>
-                  <a:pt x="490691" y="11756903"/>
-                </a:moveTo>
-                <a:cubicBezTo>
-                  <a:pt x="576640" y="11756478"/>
-                  <a:pt x="661187" y="11782498"/>
-                  <a:pt x="733817" y="11837830"/>
-                </a:cubicBezTo>
-                <a:cubicBezTo>
-                  <a:pt x="733817" y="11837830"/>
-                  <a:pt x="733817" y="11837830"/>
-                  <a:pt x="1808437" y="12656501"/>
-                </a:cubicBezTo>
-                <a:cubicBezTo>
-                  <a:pt x="2002119" y="12804053"/>
-                  <a:pt x="2020477" y="13091014"/>
-                  <a:pt x="1856663" y="13306044"/>
-                </a:cubicBezTo>
-                <a:cubicBezTo>
-                  <a:pt x="1708962" y="13499922"/>
-                  <a:pt x="1430112" y="13554893"/>
-                  <a:pt x="1236430" y="13407341"/>
-                </a:cubicBezTo>
-                <a:cubicBezTo>
-                  <a:pt x="1236430" y="13407341"/>
-                  <a:pt x="1236430" y="13407341"/>
-                  <a:pt x="161810" y="12588671"/>
-                </a:cubicBezTo>
-                <a:cubicBezTo>
-                  <a:pt x="-31872" y="12441120"/>
-                  <a:pt x="-49792" y="12160062"/>
-                  <a:pt x="97910" y="11966183"/>
-                </a:cubicBezTo>
-                <a:cubicBezTo>
-                  <a:pt x="200294" y="11831790"/>
-                  <a:pt x="347442" y="11757613"/>
-                  <a:pt x="490691" y="11756903"/>
-                </a:cubicBezTo>
-                <a:close/>
-                <a:moveTo>
-                  <a:pt x="1287637" y="10710803"/>
-                </a:moveTo>
-                <a:cubicBezTo>
-                  <a:pt x="1369716" y="10715457"/>
-                  <a:pt x="1451110" y="10745615"/>
-                  <a:pt x="1523741" y="10800947"/>
-                </a:cubicBezTo>
-                <a:cubicBezTo>
-                  <a:pt x="1523741" y="10800947"/>
-                  <a:pt x="1523741" y="10800947"/>
-                  <a:pt x="2598361" y="11619618"/>
-                </a:cubicBezTo>
-                <a:cubicBezTo>
-                  <a:pt x="2792042" y="11767170"/>
-                  <a:pt x="2832808" y="12024717"/>
-                  <a:pt x="2667707" y="12241437"/>
-                </a:cubicBezTo>
-                <a:cubicBezTo>
-                  <a:pt x="2521245" y="12433688"/>
-                  <a:pt x="2243477" y="12487239"/>
-                  <a:pt x="2049794" y="12339687"/>
-                </a:cubicBezTo>
-                <a:cubicBezTo>
-                  <a:pt x="2049794" y="12339687"/>
-                  <a:pt x="2049794" y="12339687"/>
-                  <a:pt x="975175" y="11521017"/>
-                </a:cubicBezTo>
-                <a:cubicBezTo>
-                  <a:pt x="781493" y="11373465"/>
-                  <a:pt x="762492" y="11093830"/>
-                  <a:pt x="908953" y="10901578"/>
-                </a:cubicBezTo>
-                <a:cubicBezTo>
-                  <a:pt x="1012143" y="10766128"/>
-                  <a:pt x="1150840" y="10703045"/>
-                  <a:pt x="1287637" y="10710803"/>
-                </a:cubicBezTo>
-                <a:close/>
-                <a:moveTo>
-                  <a:pt x="1721569" y="9334566"/>
-                </a:moveTo>
-                <a:cubicBezTo>
-                  <a:pt x="1803463" y="9333793"/>
-                  <a:pt x="1882852" y="9356669"/>
-                  <a:pt x="1947183" y="9405678"/>
-                </a:cubicBezTo>
-                <a:cubicBezTo>
-                  <a:pt x="1947183" y="9405678"/>
-                  <a:pt x="1947183" y="9405678"/>
-                  <a:pt x="3834230" y="10843275"/>
-                </a:cubicBezTo>
-                <a:cubicBezTo>
-                  <a:pt x="4005780" y="10973966"/>
-                  <a:pt x="4026594" y="11257225"/>
-                  <a:pt x="3878894" y="11451101"/>
-                </a:cubicBezTo>
-                <a:cubicBezTo>
-                  <a:pt x="3712398" y="11669653"/>
-                  <a:pt x="3433780" y="11724797"/>
-                  <a:pt x="3262230" y="11594106"/>
-                </a:cubicBezTo>
-                <a:cubicBezTo>
-                  <a:pt x="3262230" y="11594106"/>
-                  <a:pt x="3262230" y="11594106"/>
-                  <a:pt x="1375183" y="10156508"/>
-                </a:cubicBezTo>
-                <a:cubicBezTo>
-                  <a:pt x="1203633" y="10025818"/>
-                  <a:pt x="1182818" y="9742560"/>
-                  <a:pt x="1349316" y="9524008"/>
-                </a:cubicBezTo>
-                <a:cubicBezTo>
-                  <a:pt x="1441628" y="9402835"/>
-                  <a:pt x="1585080" y="9335855"/>
-                  <a:pt x="1721569" y="9334566"/>
-                </a:cubicBezTo>
-                <a:close/>
-                <a:moveTo>
-                  <a:pt x="2101387" y="7936576"/>
-                </a:moveTo>
-                <a:cubicBezTo>
-                  <a:pt x="2186631" y="7938355"/>
-                  <a:pt x="2271321" y="7965270"/>
-                  <a:pt x="2344041" y="8020670"/>
-                </a:cubicBezTo>
-                <a:cubicBezTo>
-                  <a:pt x="2344041" y="8020670"/>
-                  <a:pt x="2344041" y="8020670"/>
-                  <a:pt x="5052676" y="10084172"/>
-                </a:cubicBezTo>
-                <a:cubicBezTo>
-                  <a:pt x="5246596" y="10231905"/>
-                  <a:pt x="5267826" y="10515482"/>
-                  <a:pt x="5120124" y="10709361"/>
-                </a:cubicBezTo>
-                <a:cubicBezTo>
-                  <a:pt x="4953624" y="10927915"/>
-                  <a:pt x="4674590" y="10982744"/>
-                  <a:pt x="4480668" y="10835011"/>
-                </a:cubicBezTo>
-                <a:cubicBezTo>
-                  <a:pt x="4480668" y="10835011"/>
-                  <a:pt x="4480668" y="10835011"/>
-                  <a:pt x="1772034" y="8771509"/>
-                </a:cubicBezTo>
-                <a:cubicBezTo>
-                  <a:pt x="1578113" y="8623776"/>
-                  <a:pt x="1556883" y="8340198"/>
-                  <a:pt x="1723383" y="8121644"/>
-                </a:cubicBezTo>
-                <a:cubicBezTo>
-                  <a:pt x="1815697" y="8000470"/>
-                  <a:pt x="1959313" y="7933611"/>
-                  <a:pt x="2101387" y="7936576"/>
-                </a:cubicBezTo>
-                <a:close/>
-                <a:moveTo>
-                  <a:pt x="1945410" y="6115309"/>
-                </a:moveTo>
-                <a:cubicBezTo>
-                  <a:pt x="2031653" y="6115412"/>
-                  <a:pt x="2116421" y="6141783"/>
-                  <a:pt x="2188908" y="6197004"/>
-                </a:cubicBezTo>
-                <a:cubicBezTo>
-                  <a:pt x="2188908" y="6197004"/>
-                  <a:pt x="2188908" y="6197004"/>
-                  <a:pt x="6859286" y="9755006"/>
-                </a:cubicBezTo>
-                <a:cubicBezTo>
-                  <a:pt x="7052586" y="9902268"/>
-                  <a:pt x="7052554" y="10173950"/>
-                  <a:pt x="6889502" y="10387978"/>
-                </a:cubicBezTo>
-                <a:cubicBezTo>
-                  <a:pt x="6742488" y="10580955"/>
-                  <a:pt x="6480566" y="10653123"/>
-                  <a:pt x="6287266" y="10505862"/>
-                </a:cubicBezTo>
-                <a:cubicBezTo>
-                  <a:pt x="6287266" y="10505862"/>
-                  <a:pt x="6287266" y="10505862"/>
-                  <a:pt x="1616888" y="6947860"/>
-                </a:cubicBezTo>
-                <a:cubicBezTo>
-                  <a:pt x="1423588" y="6800599"/>
-                  <a:pt x="1404912" y="6514668"/>
-                  <a:pt x="1551927" y="6321692"/>
-                </a:cubicBezTo>
-                <a:cubicBezTo>
-                  <a:pt x="1653834" y="6187921"/>
-                  <a:pt x="1801671" y="6115135"/>
-                  <a:pt x="1945410" y="6115309"/>
-                </a:cubicBezTo>
-                <a:close/>
-                <a:moveTo>
-                  <a:pt x="1120711" y="3826332"/>
-                </a:moveTo>
-                <a:cubicBezTo>
-                  <a:pt x="1205571" y="3828346"/>
-                  <a:pt x="1289952" y="3855341"/>
-                  <a:pt x="1362501" y="3910611"/>
-                </a:cubicBezTo>
-                <a:cubicBezTo>
-                  <a:pt x="1362501" y="3910611"/>
-                  <a:pt x="1362501" y="3910611"/>
-                  <a:pt x="9297658" y="9955798"/>
-                </a:cubicBezTo>
-                <a:cubicBezTo>
-                  <a:pt x="9491122" y="10103183"/>
-                  <a:pt x="9491234" y="10368433"/>
-                  <a:pt x="9344772" y="10560687"/>
-                </a:cubicBezTo>
-                <a:cubicBezTo>
-                  <a:pt x="9179666" y="10777410"/>
-                  <a:pt x="8942548" y="10823263"/>
-                  <a:pt x="8749084" y="10675877"/>
-                </a:cubicBezTo>
-                <a:cubicBezTo>
-                  <a:pt x="8749084" y="10675877"/>
-                  <a:pt x="8749084" y="10675877"/>
-                  <a:pt x="813928" y="4630689"/>
-                </a:cubicBezTo>
-                <a:cubicBezTo>
-                  <a:pt x="620463" y="4483305"/>
-                  <a:pt x="579867" y="4225882"/>
-                  <a:pt x="744971" y="4009160"/>
-                </a:cubicBezTo>
-                <a:cubicBezTo>
-                  <a:pt x="836511" y="3889001"/>
-                  <a:pt x="979277" y="3822972"/>
-                  <a:pt x="1120711" y="3826332"/>
-                </a:cubicBezTo>
-                <a:close/>
-                <a:moveTo>
-                  <a:pt x="4227254" y="2790686"/>
-                </a:moveTo>
-                <a:cubicBezTo>
-                  <a:pt x="4310200" y="2788659"/>
-                  <a:pt x="4389662" y="2811590"/>
-                  <a:pt x="4454070" y="2860658"/>
-                </a:cubicBezTo>
-                <a:cubicBezTo>
-                  <a:pt x="4454070" y="2860658"/>
-                  <a:pt x="4454070" y="2860658"/>
-                  <a:pt x="9475564" y="6686148"/>
-                </a:cubicBezTo>
-                <a:cubicBezTo>
-                  <a:pt x="9647320" y="6816995"/>
-                  <a:pt x="9671436" y="7102770"/>
-                  <a:pt x="9504938" y="7321320"/>
-                </a:cubicBezTo>
-                <a:cubicBezTo>
-                  <a:pt x="9357238" y="7515197"/>
-                  <a:pt x="9075320" y="7567825"/>
-                  <a:pt x="8903564" y="7436978"/>
-                </a:cubicBezTo>
-                <a:cubicBezTo>
-                  <a:pt x="8903564" y="7436978"/>
-                  <a:pt x="8903564" y="7436978"/>
-                  <a:pt x="3882070" y="3611488"/>
-                </a:cubicBezTo>
-                <a:cubicBezTo>
-                  <a:pt x="3710313" y="3480640"/>
-                  <a:pt x="3689321" y="3197246"/>
-                  <a:pt x="3837020" y="3003370"/>
-                </a:cubicBezTo>
-                <a:cubicBezTo>
-                  <a:pt x="3941082" y="2866775"/>
-                  <a:pt x="4089010" y="2794065"/>
-                  <a:pt x="4227254" y="2790686"/>
-                </a:cubicBezTo>
-                <a:close/>
-                <a:moveTo>
-                  <a:pt x="5978286" y="2454748"/>
-                </a:moveTo>
-                <a:cubicBezTo>
-                  <a:pt x="6060956" y="2459853"/>
-                  <a:pt x="6142436" y="2490076"/>
-                  <a:pt x="6213830" y="2544466"/>
-                </a:cubicBezTo>
-                <a:cubicBezTo>
-                  <a:pt x="6213830" y="2544466"/>
-                  <a:pt x="6213830" y="2544466"/>
-                  <a:pt x="9303674" y="4898383"/>
-                </a:cubicBezTo>
-                <a:cubicBezTo>
-                  <a:pt x="9497180" y="5045798"/>
-                  <a:pt x="9515962" y="5286598"/>
-                  <a:pt x="9350860" y="5503319"/>
-                </a:cubicBezTo>
-                <a:cubicBezTo>
-                  <a:pt x="9204398" y="5695570"/>
-                  <a:pt x="8948614" y="5765868"/>
-                  <a:pt x="8755108" y="5618451"/>
-                </a:cubicBezTo>
-                <a:cubicBezTo>
-                  <a:pt x="8755108" y="5618451"/>
-                  <a:pt x="8755108" y="5618451"/>
-                  <a:pt x="5665264" y="3264535"/>
-                </a:cubicBezTo>
-                <a:cubicBezTo>
-                  <a:pt x="5474880" y="3119496"/>
-                  <a:pt x="5449770" y="2835207"/>
-                  <a:pt x="5596232" y="2642955"/>
-                </a:cubicBezTo>
-                <a:cubicBezTo>
-                  <a:pt x="5699420" y="2507505"/>
-                  <a:pt x="5840504" y="2446239"/>
-                  <a:pt x="5978286" y="2454748"/>
-                </a:cubicBezTo>
-                <a:close/>
-                <a:moveTo>
-                  <a:pt x="1124504" y="2113497"/>
-                </a:moveTo>
-                <a:cubicBezTo>
-                  <a:pt x="1210071" y="2114841"/>
-                  <a:pt x="1294642" y="2141060"/>
-                  <a:pt x="1366063" y="2195470"/>
-                </a:cubicBezTo>
-                <a:cubicBezTo>
-                  <a:pt x="1366063" y="2195470"/>
-                  <a:pt x="1366063" y="2195470"/>
-                  <a:pt x="10938820" y="9488219"/>
-                </a:cubicBezTo>
-                <a:cubicBezTo>
-                  <a:pt x="11132398" y="9635692"/>
-                  <a:pt x="11129432" y="9905139"/>
-                  <a:pt x="10982418" y="10098117"/>
-                </a:cubicBezTo>
-                <a:cubicBezTo>
-                  <a:pt x="10819366" y="10312145"/>
-                  <a:pt x="10560378" y="10386547"/>
-                  <a:pt x="10366800" y="10239076"/>
-                </a:cubicBezTo>
-                <a:cubicBezTo>
-                  <a:pt x="10366800" y="10239076"/>
-                  <a:pt x="10366800" y="10239076"/>
-                  <a:pt x="794043" y="2946327"/>
-                </a:cubicBezTo>
-                <a:cubicBezTo>
-                  <a:pt x="603587" y="2801233"/>
-                  <a:pt x="581575" y="2512756"/>
-                  <a:pt x="744627" y="2298728"/>
-                </a:cubicBezTo>
-                <a:cubicBezTo>
-                  <a:pt x="836511" y="2178117"/>
-                  <a:pt x="981892" y="2111258"/>
-                  <a:pt x="1124504" y="2113497"/>
-                </a:cubicBezTo>
-                <a:close/>
-                <a:moveTo>
-                  <a:pt x="7356102" y="1797588"/>
-                </a:moveTo>
-                <a:cubicBezTo>
-                  <a:pt x="7437918" y="1796756"/>
-                  <a:pt x="7517214" y="1819562"/>
-                  <a:pt x="7581448" y="1868497"/>
-                </a:cubicBezTo>
-                <a:cubicBezTo>
-                  <a:pt x="7581448" y="1868497"/>
-                  <a:pt x="7581448" y="1868497"/>
-                  <a:pt x="9593352" y="3401213"/>
-                </a:cubicBezTo>
-                <a:cubicBezTo>
-                  <a:pt x="9764644" y="3531709"/>
-                  <a:pt x="9785234" y="3814795"/>
-                  <a:pt x="9637536" y="4008670"/>
-                </a:cubicBezTo>
-                <a:cubicBezTo>
-                  <a:pt x="9471038" y="4227222"/>
-                  <a:pt x="9192646" y="4282538"/>
-                  <a:pt x="9021352" y="4152044"/>
-                </a:cubicBezTo>
-                <a:cubicBezTo>
-                  <a:pt x="9021352" y="4152044"/>
-                  <a:pt x="9021352" y="4152044"/>
-                  <a:pt x="7009448" y="2619328"/>
-                </a:cubicBezTo>
-                <a:cubicBezTo>
-                  <a:pt x="6838156" y="2488833"/>
-                  <a:pt x="6817566" y="2205746"/>
-                  <a:pt x="6984064" y="1987194"/>
-                </a:cubicBezTo>
-                <a:cubicBezTo>
-                  <a:pt x="7076376" y="1866022"/>
-                  <a:pt x="7219740" y="1798975"/>
-                  <a:pt x="7356102" y="1797588"/>
-                </a:cubicBezTo>
-                <a:close/>
-                <a:moveTo>
-                  <a:pt x="8626238" y="1077861"/>
-                </a:moveTo>
-                <a:cubicBezTo>
-                  <a:pt x="8710866" y="1079170"/>
-                  <a:pt x="8795034" y="1105687"/>
-                  <a:pt x="8867664" y="1161018"/>
-                </a:cubicBezTo>
-                <a:cubicBezTo>
-                  <a:pt x="8867664" y="1161018"/>
-                  <a:pt x="8867664" y="1161018"/>
-                  <a:pt x="9942284" y="1979689"/>
-                </a:cubicBezTo>
-                <a:cubicBezTo>
-                  <a:pt x="10135964" y="2127242"/>
-                  <a:pt x="10157008" y="2410678"/>
-                  <a:pt x="10009308" y="2604557"/>
-                </a:cubicBezTo>
-                <a:cubicBezTo>
-                  <a:pt x="9842808" y="2823111"/>
-                  <a:pt x="9563958" y="2878081"/>
-                  <a:pt x="9370276" y="2730530"/>
-                </a:cubicBezTo>
-                <a:cubicBezTo>
-                  <a:pt x="9370276" y="2730530"/>
-                  <a:pt x="9370276" y="2730530"/>
-                  <a:pt x="8295656" y="1911858"/>
-                </a:cubicBezTo>
-                <a:cubicBezTo>
-                  <a:pt x="8101974" y="1764307"/>
-                  <a:pt x="8084054" y="1483251"/>
-                  <a:pt x="8250554" y="1264696"/>
-                </a:cubicBezTo>
-                <a:cubicBezTo>
-                  <a:pt x="8342868" y="1143522"/>
-                  <a:pt x="8485190" y="1075680"/>
-                  <a:pt x="8626238" y="1077861"/>
-                </a:cubicBezTo>
-                <a:close/>
-                <a:moveTo>
-                  <a:pt x="9447378" y="1"/>
-                </a:moveTo>
-                <a:cubicBezTo>
-                  <a:pt x="9532998" y="9"/>
-                  <a:pt x="9617166" y="26526"/>
-                  <a:pt x="9689796" y="81858"/>
-                </a:cubicBezTo>
-                <a:cubicBezTo>
-                  <a:pt x="9689796" y="81858"/>
-                  <a:pt x="9689796" y="81858"/>
-                  <a:pt x="10764416" y="900529"/>
-                </a:cubicBezTo>
-                <a:cubicBezTo>
-                  <a:pt x="10958096" y="1048080"/>
-                  <a:pt x="10979140" y="1331516"/>
-                  <a:pt x="10812642" y="1550070"/>
-                </a:cubicBezTo>
-                <a:cubicBezTo>
-                  <a:pt x="10664940" y="1743949"/>
-                  <a:pt x="10386090" y="1798919"/>
-                  <a:pt x="10192408" y="1651368"/>
-                </a:cubicBezTo>
-                <a:cubicBezTo>
-                  <a:pt x="10192408" y="1651368"/>
-                  <a:pt x="10192408" y="1651368"/>
-                  <a:pt x="9117788" y="832697"/>
-                </a:cubicBezTo>
-                <a:cubicBezTo>
-                  <a:pt x="8924106" y="685146"/>
-                  <a:pt x="8906186" y="404090"/>
-                  <a:pt x="9053888" y="210211"/>
-                </a:cubicBezTo>
-                <a:cubicBezTo>
-                  <a:pt x="9157950" y="73615"/>
-                  <a:pt x="9304680" y="-11"/>
-                  <a:pt x="9447378" y="1"/>
-                </a:cubicBezTo>
-                <a:close/>
-              </a:path>
-            </a:pathLst>
-          </a:custGeom>
-          <a:effectLst/>
-        </p:spPr>
-        <p:txBody>
-          <a:bodyPr wrap="square">
-            <a:noAutofit/>
-          </a:bodyPr>
-          <a:lstStyle>
-            <a:lvl1pPr marL="0" indent="0">
-              <a:buNone/>
-              <a:defRPr sz="1575">
-                <a:ln>
-                  <a:noFill/>
-                </a:ln>
-                <a:solidFill>
-                  <a:schemeClr val="bg1">
-                    <a:lumMod val="85000"/>
-                  </a:schemeClr>
-                </a:solidFill>
-                <a:latin typeface="Lato Light" charset="0"/>
-                <a:ea typeface="Lato Light" charset="0"/>
-                <a:cs typeface="Lato Light" charset="0"/>
-              </a:defRPr>
-            </a:lvl1pPr>
-          </a:lstStyle>
-          <a:p>
-            <a:pPr lvl="0"/>
-            <a:endParaRPr lang="en-US" noProof="0"/>
-          </a:p>
-        </p:txBody>
-      </p:sp>
-    </p:spTree>
-    <p:extLst>
-      <p:ext uri="{BB962C8B-B14F-4D97-AF65-F5344CB8AC3E}">
-        <p14:creationId xmlns:p14="http://schemas.microsoft.com/office/powerpoint/2010/main" val="1975208394"/>
+        <p14:creationId xmlns:p14="http://schemas.microsoft.com/office/powerpoint/2010/main" val="486606442"/>
       </p:ext>
     </p:extLst>
   </p:cSld>
@@ -4329,310 +2937,7 @@
 </file>
 
 <file path=ppt/slideLayouts/slideLayout5.xml><?xml version="1.0" encoding="utf-8"?>
-<p:sldLayout xmlns:a="http://schemas.openxmlformats.org/drawingml/2006/main" xmlns:r="http://schemas.openxmlformats.org/officeDocument/2006/relationships" xmlns:p="http://schemas.openxmlformats.org/presentationml/2006/main" userDrawn="1">
-  <p:cSld name="1_Title">
-    <p:spTree>
-      <p:nvGrpSpPr>
-        <p:cNvPr id="1" name=""/>
-        <p:cNvGrpSpPr/>
-        <p:nvPr/>
-      </p:nvGrpSpPr>
-      <p:grpSpPr>
-        <a:xfrm>
-          <a:off x="0" y="0"/>
-          <a:ext cx="0" cy="0"/>
-          <a:chOff x="0" y="0"/>
-          <a:chExt cx="0" cy="0"/>
-        </a:xfrm>
-      </p:grpSpPr>
-      <p:sp>
-        <p:nvSpPr>
-          <p:cNvPr id="4" name="Text Placeholder 3">
-            <a:extLst>
-              <a:ext uri="{FF2B5EF4-FFF2-40B4-BE49-F238E27FC236}">
-                <a16:creationId xmlns:a16="http://schemas.microsoft.com/office/drawing/2014/main" id="{B2E15569-5CA8-4605-A626-660820F6E4D1}"/>
-              </a:ext>
-            </a:extLst>
-          </p:cNvPr>
-          <p:cNvSpPr>
-            <a:spLocks noGrp="1"/>
-          </p:cNvSpPr>
-          <p:nvPr>
-            <p:ph type="body" sz="quarter" idx="10" hasCustomPrompt="1"/>
-          </p:nvPr>
-        </p:nvSpPr>
-        <p:spPr>
-          <a:xfrm>
-            <a:off x="393700" y="366541"/>
-            <a:ext cx="11404600" cy="360000"/>
-          </a:xfrm>
-          <a:prstGeom prst="rect">
-            <a:avLst/>
-          </a:prstGeom>
-        </p:spPr>
-        <p:txBody>
-          <a:bodyPr vert="horz" lIns="0" tIns="0" rIns="0" bIns="0" rtlCol="0" anchor="t">
-            <a:noAutofit/>
-          </a:bodyPr>
-          <a:lstStyle>
-            <a:lvl1pPr marL="0" indent="0">
-              <a:buNone/>
-              <a:defRPr lang="en-US" sz="2500" b="1" smtClean="0">
-                <a:latin typeface="+mj-lt"/>
-                <a:ea typeface="+mj-ea"/>
-                <a:cs typeface="+mj-cs"/>
-              </a:defRPr>
-            </a:lvl1pPr>
-            <a:lvl2pPr>
-              <a:defRPr lang="en-US" smtClean="0"/>
-            </a:lvl2pPr>
-            <a:lvl3pPr>
-              <a:defRPr lang="en-US" smtClean="0"/>
-            </a:lvl3pPr>
-            <a:lvl4pPr>
-              <a:defRPr lang="en-US" smtClean="0"/>
-            </a:lvl4pPr>
-            <a:lvl5pPr>
-              <a:defRPr lang="en-GB"/>
-            </a:lvl5pPr>
-          </a:lstStyle>
-          <a:p>
-            <a:pPr marL="152400" lvl="0" indent="-152400">
-              <a:lnSpc>
-                <a:spcPct val="90000"/>
-              </a:lnSpc>
-              <a:spcBef>
-                <a:spcPct val="0"/>
-              </a:spcBef>
-            </a:pPr>
-            <a:r>
-              <a:rPr lang="en-US"/>
-              <a:t>Add title</a:t>
-            </a:r>
-            <a:endParaRPr lang="en-GB"/>
-          </a:p>
-        </p:txBody>
-      </p:sp>
-    </p:spTree>
-    <p:extLst>
-      <p:ext uri="{BB962C8B-B14F-4D97-AF65-F5344CB8AC3E}">
-        <p14:creationId xmlns:p14="http://schemas.microsoft.com/office/powerpoint/2010/main" val="4258322620"/>
-      </p:ext>
-    </p:extLst>
-  </p:cSld>
-  <p:clrMapOvr>
-    <a:masterClrMapping/>
-  </p:clrMapOvr>
-  <mc:AlternateContent xmlns:mc="http://schemas.openxmlformats.org/markup-compatibility/2006" xmlns:p14="http://schemas.microsoft.com/office/powerpoint/2010/main">
-    <mc:Choice Requires="p14">
-      <p:transition spd="slow" p14:dur="1200">
-        <p14:prism/>
-      </p:transition>
-    </mc:Choice>
-    <mc:Fallback xmlns="">
-      <p:transition spd="slow">
-        <p:fade/>
-      </p:transition>
-    </mc:Fallback>
-  </mc:AlternateContent>
-</p:sldLayout>
-</file>
-
-<file path=ppt/slideLayouts/slideLayout6.xml><?xml version="1.0" encoding="utf-8"?>
-<p:sldLayout xmlns:a="http://schemas.openxmlformats.org/drawingml/2006/main" xmlns:r="http://schemas.openxmlformats.org/officeDocument/2006/relationships" xmlns:p="http://schemas.openxmlformats.org/presentationml/2006/main" type="titleOnly">
-  <p:cSld name="Title Only">
-    <p:spTree>
-      <p:nvGrpSpPr>
-        <p:cNvPr id="1" name=""/>
-        <p:cNvGrpSpPr/>
-        <p:nvPr/>
-      </p:nvGrpSpPr>
-      <p:grpSpPr>
-        <a:xfrm>
-          <a:off x="0" y="0"/>
-          <a:ext cx="0" cy="0"/>
-          <a:chOff x="0" y="0"/>
-          <a:chExt cx="0" cy="0"/>
-        </a:xfrm>
-      </p:grpSpPr>
-      <p:graphicFrame>
-        <p:nvGraphicFramePr>
-          <p:cNvPr id="6" name="Object 5" hidden="1">
-            <a:extLst>
-              <a:ext uri="{FF2B5EF4-FFF2-40B4-BE49-F238E27FC236}">
-                <a16:creationId xmlns:a16="http://schemas.microsoft.com/office/drawing/2014/main" id="{FD46B626-92F4-449F-9587-B342F55F9C4B}"/>
-              </a:ext>
-            </a:extLst>
-          </p:cNvPr>
-          <p:cNvGraphicFramePr>
-            <a:graphicFrameLocks noChangeAspect="1"/>
-          </p:cNvGraphicFramePr>
-          <p:nvPr userDrawn="1">
-            <p:custDataLst>
-              <p:tags r:id="rId1"/>
-            </p:custDataLst>
-          </p:nvPr>
-        </p:nvGraphicFramePr>
-        <p:xfrm>
-          <a:off x="1588" y="1588"/>
-          <a:ext cx="1587" cy="1587"/>
-        </p:xfrm>
-        <a:graphic>
-          <a:graphicData uri="http://schemas.openxmlformats.org/presentationml/2006/ole">
-            <mc:AlternateContent xmlns:mc="http://schemas.openxmlformats.org/markup-compatibility/2006">
-              <mc:Choice xmlns:v="urn:schemas-microsoft-com:vml" Requires="v">
-                <p:oleObj name="think-cell Slide" r:id="rId3" imgW="347" imgH="348" progId="TCLayout.ActiveDocument.1">
-                  <p:embed/>
-                </p:oleObj>
-              </mc:Choice>
-              <mc:Fallback>
-                <p:oleObj name="think-cell Slide" r:id="rId3" imgW="347" imgH="348" progId="TCLayout.ActiveDocument.1">
-                  <p:embed/>
-                  <p:pic>
-                    <p:nvPicPr>
-                      <p:cNvPr id="6" name="Object 5" hidden="1">
-                        <a:extLst>
-                          <a:ext uri="{FF2B5EF4-FFF2-40B4-BE49-F238E27FC236}">
-                            <a16:creationId xmlns:a16="http://schemas.microsoft.com/office/drawing/2014/main" id="{FD46B626-92F4-449F-9587-B342F55F9C4B}"/>
-                          </a:ext>
-                        </a:extLst>
-                      </p:cNvPr>
-                      <p:cNvPicPr/>
-                      <p:nvPr/>
-                    </p:nvPicPr>
-                    <p:blipFill>
-                      <a:blip r:embed="rId4"/>
-                      <a:stretch>
-                        <a:fillRect/>
-                      </a:stretch>
-                    </p:blipFill>
-                    <p:spPr>
-                      <a:xfrm>
-                        <a:off x="1588" y="1588"/>
-                        <a:ext cx="1587" cy="1587"/>
-                      </a:xfrm>
-                      <a:prstGeom prst="rect">
-                        <a:avLst/>
-                      </a:prstGeom>
-                    </p:spPr>
-                  </p:pic>
-                </p:oleObj>
-              </mc:Fallback>
-            </mc:AlternateContent>
-          </a:graphicData>
-        </a:graphic>
-      </p:graphicFrame>
-      <p:sp>
-        <p:nvSpPr>
-          <p:cNvPr id="2" name="Title 1"/>
-          <p:cNvSpPr>
-            <a:spLocks noGrp="1"/>
-          </p:cNvSpPr>
-          <p:nvPr>
-            <p:ph type="title"/>
-          </p:nvPr>
-        </p:nvSpPr>
-        <p:spPr/>
-        <p:txBody>
-          <a:bodyPr/>
-          <a:lstStyle/>
-          <a:p>
-            <a:r>
-              <a:rPr lang="en-US" dirty="0"/>
-              <a:t>Click to edit Master title style</a:t>
-            </a:r>
-            <a:endParaRPr lang="en-GB" dirty="0"/>
-          </a:p>
-        </p:txBody>
-      </p:sp>
-      <p:sp>
-        <p:nvSpPr>
-          <p:cNvPr id="3" name="Date Placeholder 2"/>
-          <p:cNvSpPr>
-            <a:spLocks noGrp="1"/>
-          </p:cNvSpPr>
-          <p:nvPr>
-            <p:ph type="dt" sz="half" idx="10"/>
-          </p:nvPr>
-        </p:nvSpPr>
-        <p:spPr/>
-        <p:txBody>
-          <a:bodyPr/>
-          <a:lstStyle/>
-          <a:p>
-            <a:fld id="{92F64031-640B-4962-8CF9-EAD8AB4A604D}" type="datetimeFigureOut">
-              <a:rPr lang="en-GB" smtClean="0"/>
-              <a:t>29/08/2021</a:t>
-            </a:fld>
-            <a:endParaRPr lang="en-GB"/>
-          </a:p>
-        </p:txBody>
-      </p:sp>
-      <p:sp>
-        <p:nvSpPr>
-          <p:cNvPr id="4" name="Footer Placeholder 3"/>
-          <p:cNvSpPr>
-            <a:spLocks noGrp="1"/>
-          </p:cNvSpPr>
-          <p:nvPr>
-            <p:ph type="ftr" sz="quarter" idx="11"/>
-          </p:nvPr>
-        </p:nvSpPr>
-        <p:spPr/>
-        <p:txBody>
-          <a:bodyPr/>
-          <a:lstStyle/>
-          <a:p>
-            <a:endParaRPr lang="en-GB"/>
-          </a:p>
-        </p:txBody>
-      </p:sp>
-      <p:sp>
-        <p:nvSpPr>
-          <p:cNvPr id="5" name="Slide Number Placeholder 4"/>
-          <p:cNvSpPr>
-            <a:spLocks noGrp="1"/>
-          </p:cNvSpPr>
-          <p:nvPr>
-            <p:ph type="sldNum" sz="quarter" idx="12"/>
-          </p:nvPr>
-        </p:nvSpPr>
-        <p:spPr>
-          <a:xfrm>
-            <a:off x="8610600" y="6356350"/>
-            <a:ext cx="2743200" cy="365125"/>
-          </a:xfrm>
-          <a:prstGeom prst="rect">
-            <a:avLst/>
-          </a:prstGeom>
-        </p:spPr>
-        <p:txBody>
-          <a:bodyPr/>
-          <a:lstStyle/>
-          <a:p>
-            <a:fld id="{0D8F0A42-4B1E-4613-8C4D-AAA004DCF1D5}" type="slidenum">
-              <a:rPr lang="en-GB" smtClean="0"/>
-              <a:t>‹#›</a:t>
-            </a:fld>
-            <a:endParaRPr lang="en-GB"/>
-          </a:p>
-        </p:txBody>
-      </p:sp>
-    </p:spTree>
-    <p:extLst>
-      <p:ext uri="{BB962C8B-B14F-4D97-AF65-F5344CB8AC3E}">
-        <p14:creationId xmlns:p14="http://schemas.microsoft.com/office/powerpoint/2010/main" val="3072655499"/>
-      </p:ext>
-    </p:extLst>
-  </p:cSld>
-  <p:clrMapOvr>
-    <a:masterClrMapping/>
-  </p:clrMapOvr>
-</p:sldLayout>
-</file>
-
-<file path=ppt/slideLayouts/slideLayout7.xml><?xml version="1.0" encoding="utf-8"?>
-<p:sldLayout xmlns:a="http://schemas.openxmlformats.org/drawingml/2006/main" xmlns:r="http://schemas.openxmlformats.org/officeDocument/2006/relationships" xmlns:p="http://schemas.openxmlformats.org/presentationml/2006/main" type="title" preserve="1">
+<p:sldLayout xmlns:a="http://schemas.openxmlformats.org/drawingml/2006/main" xmlns:r="http://schemas.openxmlformats.org/officeDocument/2006/relationships" xmlns:p="http://schemas.openxmlformats.org/presentationml/2006/main" type="title">
   <p:cSld name="Title Slide">
     <p:bg>
       <p:bgRef idx="1001">
@@ -4661,7 +2966,7 @@
           </p:cNvGraphicFramePr>
           <p:nvPr userDrawn="1">
             <p:custDataLst>
-              <p:tags r:id="rId1"/>
+              <p:tags r:id="rId2"/>
             </p:custDataLst>
           </p:nvPr>
         </p:nvGraphicFramePr>
@@ -4673,12 +2978,12 @@
           <a:graphicData uri="http://schemas.openxmlformats.org/presentationml/2006/ole">
             <mc:AlternateContent xmlns:mc="http://schemas.openxmlformats.org/markup-compatibility/2006">
               <mc:Choice xmlns:v="urn:schemas-microsoft-com:vml" Requires="v">
-                <p:oleObj name="think-cell Slide" r:id="rId3" imgW="425" imgH="426" progId="TCLayout.ActiveDocument.1">
+                <p:oleObj spid="_x0000_s9219" name="think-cell Slide" r:id="rId4" imgW="425" imgH="426" progId="TCLayout.ActiveDocument.1">
                   <p:embed/>
                 </p:oleObj>
               </mc:Choice>
               <mc:Fallback>
-                <p:oleObj name="think-cell Slide" r:id="rId3" imgW="425" imgH="426" progId="TCLayout.ActiveDocument.1">
+                <p:oleObj name="think-cell Slide" r:id="rId4" imgW="425" imgH="426" progId="TCLayout.ActiveDocument.1">
                   <p:embed/>
                   <p:pic>
                     <p:nvPicPr>
@@ -4687,7 +2992,7 @@
                       <p:nvPr/>
                     </p:nvPicPr>
                     <p:blipFill>
-                      <a:blip r:embed="rId4"/>
+                      <a:blip r:embed="rId5"/>
                       <a:stretch>
                         <a:fillRect/>
                       </a:stretch>
@@ -4881,10 +3186,10 @@
       </p:sp>
       <p:pic>
         <p:nvPicPr>
-          <p:cNvPr id="13" name="Picture 12">
+          <p:cNvPr id="6" name="Picture 5" descr="A poster for a college&#10;&#10;Description automatically generated">
             <a:extLst>
               <a:ext uri="{FF2B5EF4-FFF2-40B4-BE49-F238E27FC236}">
-                <a16:creationId xmlns:a16="http://schemas.microsoft.com/office/drawing/2014/main" id="{A6F6840C-DE8F-4983-AB01-20F2DF0D4848}"/>
+                <a16:creationId xmlns:a16="http://schemas.microsoft.com/office/drawing/2014/main" id="{5DDB0E27-3F9C-480B-BB07-040B73597379}"/>
               </a:ext>
             </a:extLst>
           </p:cNvPr>
@@ -4893,15 +3198,22 @@
           </p:cNvPicPr>
           <p:nvPr userDrawn="1"/>
         </p:nvPicPr>
-        <p:blipFill rotWithShape="1">
-          <a:blip r:embed="rId5"/>
-          <a:srcRect t="7027"/>
-          <a:stretch/>
+        <p:blipFill>
+          <a:blip r:embed="rId6" cstate="print">
+            <a:extLst>
+              <a:ext uri="{28A0092B-C50C-407E-A947-70E740481C1C}">
+                <a14:useLocalDpi xmlns:a14="http://schemas.microsoft.com/office/drawing/2010/main" val="0"/>
+              </a:ext>
+            </a:extLst>
+          </a:blip>
+          <a:stretch>
+            <a:fillRect/>
+          </a:stretch>
         </p:blipFill>
         <p:spPr>
           <a:xfrm>
-            <a:off x="48126" y="808613"/>
-            <a:ext cx="11998993" cy="5240774"/>
+            <a:off x="0" y="279791"/>
+            <a:ext cx="5994015" cy="5994015"/>
           </a:xfrm>
           <a:prstGeom prst="rect">
             <a:avLst/>
@@ -4911,7 +3223,7 @@
     </p:spTree>
     <p:extLst>
       <p:ext uri="{BB962C8B-B14F-4D97-AF65-F5344CB8AC3E}">
-        <p14:creationId xmlns:p14="http://schemas.microsoft.com/office/powerpoint/2010/main" val="2450602093"/>
+        <p14:creationId xmlns:p14="http://schemas.microsoft.com/office/powerpoint/2010/main" val="1163812402"/>
       </p:ext>
     </p:extLst>
   </p:cSld>
@@ -4921,12 +3233,12 @@
 </p:sldLayout>
 </file>
 
-<file path=ppt/slideLayouts/slideLayout8.xml><?xml version="1.0" encoding="utf-8"?>
-<p:sldLayout xmlns:a="http://schemas.openxmlformats.org/drawingml/2006/main" xmlns:r="http://schemas.openxmlformats.org/officeDocument/2006/relationships" xmlns:p="http://schemas.openxmlformats.org/presentationml/2006/main" preserve="1" userDrawn="1">
-  <p:cSld name="7_Title Slide">
+<file path=ppt/slideLayouts/slideLayout6.xml><?xml version="1.0" encoding="utf-8"?>
+<p:sldLayout xmlns:a="http://schemas.openxmlformats.org/drawingml/2006/main" xmlns:r="http://schemas.openxmlformats.org/officeDocument/2006/relationships" xmlns:p="http://schemas.openxmlformats.org/presentationml/2006/main" matchingName="Blank" type="blank">
+  <p:cSld name="Blank">
     <p:spTree>
       <p:nvGrpSpPr>
-        <p:cNvPr id="1" name=""/>
+        <p:cNvPr id="1" name="Shape 133"/>
         <p:cNvGrpSpPr/>
         <p:nvPr/>
       </p:nvGrpSpPr>
@@ -4940,388 +3252,611 @@
       </p:grpSpPr>
       <p:sp>
         <p:nvSpPr>
-          <p:cNvPr id="4" name="Rectangle 3">
-            <a:extLst>
-              <a:ext uri="{FF2B5EF4-FFF2-40B4-BE49-F238E27FC236}">
-                <a16:creationId xmlns:a16="http://schemas.microsoft.com/office/drawing/2014/main" id="{31C53266-8226-4323-93D8-8635471CF311}"/>
-              </a:ext>
-            </a:extLst>
-          </p:cNvPr>
-          <p:cNvSpPr/>
-          <p:nvPr userDrawn="1"/>
+          <p:cNvPr id="134" name="Google Shape;134;p21"/>
+          <p:cNvSpPr txBox="1">
+            <a:spLocks noGrp="1"/>
+          </p:cNvSpPr>
+          <p:nvPr>
+            <p:ph type="dt" idx="10"/>
+          </p:nvPr>
         </p:nvSpPr>
         <p:spPr>
           <a:xfrm>
-            <a:off x="0" y="-6"/>
-            <a:ext cx="12191996" cy="6858005"/>
+            <a:off x="324415" y="6538035"/>
+            <a:ext cx="11145200" cy="169200"/>
           </a:xfrm>
           <a:prstGeom prst="rect">
             <a:avLst/>
           </a:prstGeom>
-          <a:solidFill>
-            <a:schemeClr val="accent1"/>
-          </a:solidFill>
+          <a:noFill/>
           <a:ln>
             <a:noFill/>
           </a:ln>
         </p:spPr>
-        <p:style>
-          <a:lnRef idx="2">
-            <a:schemeClr val="accent1">
-              <a:shade val="50000"/>
-            </a:schemeClr>
-          </a:lnRef>
-          <a:fillRef idx="1">
-            <a:schemeClr val="accent1"/>
-          </a:fillRef>
-          <a:effectRef idx="0">
-            <a:schemeClr val="accent1"/>
-          </a:effectRef>
-          <a:fontRef idx="minor">
-            <a:schemeClr val="lt1"/>
-          </a:fontRef>
-        </p:style>
         <p:txBody>
-          <a:bodyPr rtlCol="0" anchor="ctr"/>
-          <a:lstStyle/>
-          <a:p>
-            <a:pPr algn="ctr"/>
+          <a:bodyPr spcFirstLastPara="1" wrap="square" lIns="11425" tIns="5700" rIns="11425" bIns="5700" anchor="ctr" anchorCtr="0">
+            <a:noAutofit/>
+          </a:bodyPr>
+          <a:lstStyle>
+            <a:lvl1pPr lvl="0" algn="l" rtl="0">
+              <a:lnSpc>
+                <a:spcPct val="100000"/>
+              </a:lnSpc>
+              <a:spcBef>
+                <a:spcPts val="0"/>
+              </a:spcBef>
+              <a:spcAft>
+                <a:spcPts val="0"/>
+              </a:spcAft>
+              <a:buSzPts val="1100"/>
+              <a:buNone/>
+              <a:defRPr>
+                <a:latin typeface="Gotham Light" pitchFamily="50" charset="0"/>
+                <a:ea typeface="Gotham Light" pitchFamily="50" charset="0"/>
+                <a:cs typeface="Arial"/>
+                <a:sym typeface="Arial"/>
+              </a:defRPr>
+            </a:lvl1pPr>
+            <a:lvl2pPr lvl="1" algn="l" rtl="0">
+              <a:lnSpc>
+                <a:spcPct val="100000"/>
+              </a:lnSpc>
+              <a:spcBef>
+                <a:spcPts val="0"/>
+              </a:spcBef>
+              <a:spcAft>
+                <a:spcPts val="0"/>
+              </a:spcAft>
+              <a:buSzPts val="1100"/>
+              <a:buNone/>
+              <a:defRPr/>
+            </a:lvl2pPr>
+            <a:lvl3pPr lvl="2" algn="l" rtl="0">
+              <a:lnSpc>
+                <a:spcPct val="100000"/>
+              </a:lnSpc>
+              <a:spcBef>
+                <a:spcPts val="0"/>
+              </a:spcBef>
+              <a:spcAft>
+                <a:spcPts val="0"/>
+              </a:spcAft>
+              <a:buSzPts val="1100"/>
+              <a:buNone/>
+              <a:defRPr/>
+            </a:lvl3pPr>
+            <a:lvl4pPr lvl="3" algn="l" rtl="0">
+              <a:lnSpc>
+                <a:spcPct val="100000"/>
+              </a:lnSpc>
+              <a:spcBef>
+                <a:spcPts val="0"/>
+              </a:spcBef>
+              <a:spcAft>
+                <a:spcPts val="0"/>
+              </a:spcAft>
+              <a:buSzPts val="1100"/>
+              <a:buNone/>
+              <a:defRPr/>
+            </a:lvl4pPr>
+            <a:lvl5pPr lvl="4" algn="l" rtl="0">
+              <a:lnSpc>
+                <a:spcPct val="100000"/>
+              </a:lnSpc>
+              <a:spcBef>
+                <a:spcPts val="0"/>
+              </a:spcBef>
+              <a:spcAft>
+                <a:spcPts val="0"/>
+              </a:spcAft>
+              <a:buSzPts val="1100"/>
+              <a:buNone/>
+              <a:defRPr/>
+            </a:lvl5pPr>
+            <a:lvl6pPr lvl="5" algn="l" rtl="0">
+              <a:lnSpc>
+                <a:spcPct val="100000"/>
+              </a:lnSpc>
+              <a:spcBef>
+                <a:spcPts val="0"/>
+              </a:spcBef>
+              <a:spcAft>
+                <a:spcPts val="0"/>
+              </a:spcAft>
+              <a:buSzPts val="1100"/>
+              <a:buNone/>
+              <a:defRPr/>
+            </a:lvl6pPr>
+            <a:lvl7pPr lvl="6" algn="l" rtl="0">
+              <a:lnSpc>
+                <a:spcPct val="100000"/>
+              </a:lnSpc>
+              <a:spcBef>
+                <a:spcPts val="0"/>
+              </a:spcBef>
+              <a:spcAft>
+                <a:spcPts val="0"/>
+              </a:spcAft>
+              <a:buSzPts val="1100"/>
+              <a:buNone/>
+              <a:defRPr/>
+            </a:lvl7pPr>
+            <a:lvl8pPr lvl="7" algn="l" rtl="0">
+              <a:lnSpc>
+                <a:spcPct val="100000"/>
+              </a:lnSpc>
+              <a:spcBef>
+                <a:spcPts val="0"/>
+              </a:spcBef>
+              <a:spcAft>
+                <a:spcPts val="0"/>
+              </a:spcAft>
+              <a:buSzPts val="1100"/>
+              <a:buNone/>
+              <a:defRPr/>
+            </a:lvl8pPr>
+            <a:lvl9pPr lvl="8" algn="l" rtl="0">
+              <a:lnSpc>
+                <a:spcPct val="100000"/>
+              </a:lnSpc>
+              <a:spcBef>
+                <a:spcPts val="0"/>
+              </a:spcBef>
+              <a:spcAft>
+                <a:spcPts val="0"/>
+              </a:spcAft>
+              <a:buSzPts val="1100"/>
+              <a:buNone/>
+              <a:defRPr/>
+            </a:lvl9pPr>
+          </a:lstStyle>
+          <a:p>
             <a:endParaRPr lang="en-US"/>
           </a:p>
         </p:txBody>
       </p:sp>
       <p:sp>
         <p:nvSpPr>
-          <p:cNvPr id="38" name="Arrow: Pentagon 37">
-            <a:extLst>
-              <a:ext uri="{FF2B5EF4-FFF2-40B4-BE49-F238E27FC236}">
-                <a16:creationId xmlns:a16="http://schemas.microsoft.com/office/drawing/2014/main" id="{9787AEAF-CECE-47AD-BC55-6A8FA3B19CEE}"/>
-              </a:ext>
-            </a:extLst>
-          </p:cNvPr>
-          <p:cNvSpPr/>
-          <p:nvPr userDrawn="1"/>
+          <p:cNvPr id="135" name="Google Shape;135;p21"/>
+          <p:cNvSpPr txBox="1">
+            <a:spLocks noGrp="1"/>
+          </p:cNvSpPr>
+          <p:nvPr>
+            <p:ph type="ftr" idx="11"/>
+          </p:nvPr>
         </p:nvSpPr>
         <p:spPr>
-          <a:xfrm flipH="1">
-            <a:off x="5511800" y="-6"/>
-            <a:ext cx="6680196" cy="6877110"/>
-          </a:xfrm>
-          <a:prstGeom prst="homePlate">
-            <a:avLst>
-              <a:gd name="adj" fmla="val 26731"/>
-            </a:avLst>
-          </a:prstGeom>
-          <a:solidFill>
-            <a:schemeClr val="accent4"/>
-          </a:solidFill>
-          <a:ln>
-            <a:noFill/>
-          </a:ln>
-          <a:effectLst>
-            <a:outerShdw blurRad="266700" dist="38100" dir="10800000" algn="r" rotWithShape="0">
-              <a:prstClr val="black">
-                <a:alpha val="77000"/>
-              </a:prstClr>
-            </a:outerShdw>
-          </a:effectLst>
-        </p:spPr>
-        <p:style>
-          <a:lnRef idx="2">
-            <a:schemeClr val="accent1">
-              <a:shade val="50000"/>
-            </a:schemeClr>
-          </a:lnRef>
-          <a:fillRef idx="1">
-            <a:schemeClr val="accent1"/>
-          </a:fillRef>
-          <a:effectRef idx="0">
-            <a:schemeClr val="accent1"/>
-          </a:effectRef>
-          <a:fontRef idx="minor">
-            <a:schemeClr val="lt1"/>
-          </a:fontRef>
-        </p:style>
-        <p:txBody>
-          <a:bodyPr rtlCol="0" anchor="ctr"/>
-          <a:lstStyle/>
-          <a:p>
-            <a:pPr algn="ctr"/>
-            <a:endParaRPr lang="en-US"/>
-          </a:p>
-        </p:txBody>
-      </p:sp>
-      <p:pic>
-        <p:nvPicPr>
-          <p:cNvPr id="7" name="Picture 6">
-            <a:extLst>
-              <a:ext uri="{FF2B5EF4-FFF2-40B4-BE49-F238E27FC236}">
-                <a16:creationId xmlns:a16="http://schemas.microsoft.com/office/drawing/2014/main" id="{72A0BC6A-E73C-40BA-BB29-6604DE19F585}"/>
-              </a:ext>
-            </a:extLst>
-          </p:cNvPr>
-          <p:cNvPicPr/>
-          <p:nvPr userDrawn="1"/>
-        </p:nvPicPr>
-        <p:blipFill rotWithShape="1">
-          <a:blip r:embed="rId2" cstate="print">
-            <a:extLst>
-              <a:ext uri="{28A0092B-C50C-407E-A947-70E740481C1C}">
-                <a14:useLocalDpi xmlns:a14="http://schemas.microsoft.com/office/drawing/2010/main" val="0"/>
-              </a:ext>
-            </a:extLst>
-          </a:blip>
-          <a:srcRect l="4364" r="2644" b="1491"/>
-          <a:stretch/>
-        </p:blipFill>
-        <p:spPr>
           <a:xfrm>
-            <a:off x="7786456" y="5591279"/>
-            <a:ext cx="4391025" cy="1281234"/>
+            <a:off x="324415" y="6285068"/>
+            <a:ext cx="11145200" cy="169200"/>
           </a:xfrm>
           <a:prstGeom prst="rect">
             <a:avLst/>
           </a:prstGeom>
+          <a:noFill/>
+          <a:ln>
+            <a:noFill/>
+          </a:ln>
         </p:spPr>
-      </p:pic>
-    </p:spTree>
-    <p:extLst>
-      <p:ext uri="{BB962C8B-B14F-4D97-AF65-F5344CB8AC3E}">
-        <p14:creationId xmlns:p14="http://schemas.microsoft.com/office/powerpoint/2010/main" val="3501480314"/>
-      </p:ext>
-    </p:extLst>
-  </p:cSld>
-  <p:clrMapOvr>
-    <a:masterClrMapping/>
-  </p:clrMapOvr>
-</p:sldLayout>
-</file>
-
-<file path=ppt/slideLayouts/slideLayout9.xml><?xml version="1.0" encoding="utf-8"?>
-<p:sldLayout xmlns:a="http://schemas.openxmlformats.org/drawingml/2006/main" xmlns:r="http://schemas.openxmlformats.org/officeDocument/2006/relationships" xmlns:p="http://schemas.openxmlformats.org/presentationml/2006/main" type="obj" preserve="1">
-  <p:cSld name="Title and Content">
-    <p:spTree>
-      <p:nvGrpSpPr>
-        <p:cNvPr id="1" name=""/>
-        <p:cNvGrpSpPr/>
-        <p:nvPr/>
-      </p:nvGrpSpPr>
-      <p:grpSpPr>
-        <a:xfrm>
-          <a:off x="0" y="0"/>
-          <a:ext cx="0" cy="0"/>
-          <a:chOff x="0" y="0"/>
-          <a:chExt cx="0" cy="0"/>
-        </a:xfrm>
-      </p:grpSpPr>
-      <p:graphicFrame>
-        <p:nvGraphicFramePr>
-          <p:cNvPr id="6" name="Object 5" hidden="1">
-            <a:extLst>
-              <a:ext uri="{FF2B5EF4-FFF2-40B4-BE49-F238E27FC236}">
-                <a16:creationId xmlns:a16="http://schemas.microsoft.com/office/drawing/2014/main" id="{262DE44B-329D-44C4-A098-54D67821F0BF}"/>
-              </a:ext>
-            </a:extLst>
-          </p:cNvPr>
-          <p:cNvGraphicFramePr>
-            <a:graphicFrameLocks noChangeAspect="1"/>
-          </p:cNvGraphicFramePr>
-          <p:nvPr userDrawn="1">
-            <p:custDataLst>
-              <p:tags r:id="rId1"/>
-            </p:custDataLst>
-          </p:nvPr>
-        </p:nvGraphicFramePr>
-        <p:xfrm>
-          <a:off x="1588" y="1588"/>
-          <a:ext cx="1587" cy="1587"/>
-        </p:xfrm>
-        <a:graphic>
-          <a:graphicData uri="http://schemas.openxmlformats.org/presentationml/2006/ole">
-            <mc:AlternateContent xmlns:mc="http://schemas.openxmlformats.org/markup-compatibility/2006">
-              <mc:Choice xmlns:v="urn:schemas-microsoft-com:vml" Requires="v">
-                <p:oleObj name="think-cell Slide" r:id="rId3" imgW="347" imgH="348" progId="TCLayout.ActiveDocument.1">
-                  <p:embed/>
-                </p:oleObj>
-              </mc:Choice>
-              <mc:Fallback>
-                <p:oleObj name="think-cell Slide" r:id="rId3" imgW="347" imgH="348" progId="TCLayout.ActiveDocument.1">
-                  <p:embed/>
-                  <p:pic>
-                    <p:nvPicPr>
-                      <p:cNvPr id="6" name="Object 5" hidden="1">
-                        <a:extLst>
-                          <a:ext uri="{FF2B5EF4-FFF2-40B4-BE49-F238E27FC236}">
-                            <a16:creationId xmlns:a16="http://schemas.microsoft.com/office/drawing/2014/main" id="{262DE44B-329D-44C4-A098-54D67821F0BF}"/>
-                          </a:ext>
-                        </a:extLst>
-                      </p:cNvPr>
-                      <p:cNvPicPr/>
-                      <p:nvPr/>
-                    </p:nvPicPr>
-                    <p:blipFill>
-                      <a:blip r:embed="rId4"/>
-                      <a:stretch>
-                        <a:fillRect/>
-                      </a:stretch>
-                    </p:blipFill>
-                    <p:spPr>
-                      <a:xfrm>
-                        <a:off x="1588" y="1588"/>
-                        <a:ext cx="1587" cy="1587"/>
-                      </a:xfrm>
-                      <a:prstGeom prst="rect">
-                        <a:avLst/>
-                      </a:prstGeom>
-                    </p:spPr>
-                  </p:pic>
-                </p:oleObj>
-              </mc:Fallback>
-            </mc:AlternateContent>
-          </a:graphicData>
-        </a:graphic>
-      </p:graphicFrame>
+        <p:txBody>
+          <a:bodyPr spcFirstLastPara="1" wrap="square" lIns="11425" tIns="5700" rIns="11425" bIns="5700" anchor="ctr" anchorCtr="0">
+            <a:noAutofit/>
+          </a:bodyPr>
+          <a:lstStyle>
+            <a:lvl1pPr lvl="0" algn="l" rtl="0">
+              <a:lnSpc>
+                <a:spcPct val="100000"/>
+              </a:lnSpc>
+              <a:spcBef>
+                <a:spcPts val="0"/>
+              </a:spcBef>
+              <a:spcAft>
+                <a:spcPts val="0"/>
+              </a:spcAft>
+              <a:buSzPts val="1100"/>
+              <a:buNone/>
+              <a:defRPr>
+                <a:latin typeface="Gotham Light" pitchFamily="50" charset="0"/>
+                <a:ea typeface="Gotham Light" pitchFamily="50" charset="0"/>
+                <a:cs typeface="Arial"/>
+                <a:sym typeface="Arial"/>
+              </a:defRPr>
+            </a:lvl1pPr>
+            <a:lvl2pPr lvl="1" algn="l" rtl="0">
+              <a:lnSpc>
+                <a:spcPct val="100000"/>
+              </a:lnSpc>
+              <a:spcBef>
+                <a:spcPts val="0"/>
+              </a:spcBef>
+              <a:spcAft>
+                <a:spcPts val="0"/>
+              </a:spcAft>
+              <a:buSzPts val="1100"/>
+              <a:buNone/>
+              <a:defRPr/>
+            </a:lvl2pPr>
+            <a:lvl3pPr lvl="2" algn="l" rtl="0">
+              <a:lnSpc>
+                <a:spcPct val="100000"/>
+              </a:lnSpc>
+              <a:spcBef>
+                <a:spcPts val="0"/>
+              </a:spcBef>
+              <a:spcAft>
+                <a:spcPts val="0"/>
+              </a:spcAft>
+              <a:buSzPts val="1100"/>
+              <a:buNone/>
+              <a:defRPr/>
+            </a:lvl3pPr>
+            <a:lvl4pPr lvl="3" algn="l" rtl="0">
+              <a:lnSpc>
+                <a:spcPct val="100000"/>
+              </a:lnSpc>
+              <a:spcBef>
+                <a:spcPts val="0"/>
+              </a:spcBef>
+              <a:spcAft>
+                <a:spcPts val="0"/>
+              </a:spcAft>
+              <a:buSzPts val="1100"/>
+              <a:buNone/>
+              <a:defRPr/>
+            </a:lvl4pPr>
+            <a:lvl5pPr lvl="4" algn="l" rtl="0">
+              <a:lnSpc>
+                <a:spcPct val="100000"/>
+              </a:lnSpc>
+              <a:spcBef>
+                <a:spcPts val="0"/>
+              </a:spcBef>
+              <a:spcAft>
+                <a:spcPts val="0"/>
+              </a:spcAft>
+              <a:buSzPts val="1100"/>
+              <a:buNone/>
+              <a:defRPr/>
+            </a:lvl5pPr>
+            <a:lvl6pPr lvl="5" algn="l" rtl="0">
+              <a:lnSpc>
+                <a:spcPct val="100000"/>
+              </a:lnSpc>
+              <a:spcBef>
+                <a:spcPts val="0"/>
+              </a:spcBef>
+              <a:spcAft>
+                <a:spcPts val="0"/>
+              </a:spcAft>
+              <a:buSzPts val="1100"/>
+              <a:buNone/>
+              <a:defRPr/>
+            </a:lvl6pPr>
+            <a:lvl7pPr lvl="6" algn="l" rtl="0">
+              <a:lnSpc>
+                <a:spcPct val="100000"/>
+              </a:lnSpc>
+              <a:spcBef>
+                <a:spcPts val="0"/>
+              </a:spcBef>
+              <a:spcAft>
+                <a:spcPts val="0"/>
+              </a:spcAft>
+              <a:buSzPts val="1100"/>
+              <a:buNone/>
+              <a:defRPr/>
+            </a:lvl7pPr>
+            <a:lvl8pPr lvl="7" algn="l" rtl="0">
+              <a:lnSpc>
+                <a:spcPct val="100000"/>
+              </a:lnSpc>
+              <a:spcBef>
+                <a:spcPts val="0"/>
+              </a:spcBef>
+              <a:spcAft>
+                <a:spcPts val="0"/>
+              </a:spcAft>
+              <a:buSzPts val="1100"/>
+              <a:buNone/>
+              <a:defRPr/>
+            </a:lvl8pPr>
+            <a:lvl9pPr lvl="8" algn="l" rtl="0">
+              <a:lnSpc>
+                <a:spcPct val="100000"/>
+              </a:lnSpc>
+              <a:spcBef>
+                <a:spcPts val="0"/>
+              </a:spcBef>
+              <a:spcAft>
+                <a:spcPts val="0"/>
+              </a:spcAft>
+              <a:buSzPts val="1100"/>
+              <a:buNone/>
+              <a:defRPr/>
+            </a:lvl9pPr>
+          </a:lstStyle>
+          <a:p>
+            <a:endParaRPr lang="en-US"/>
+          </a:p>
+        </p:txBody>
+      </p:sp>
       <p:sp>
         <p:nvSpPr>
-          <p:cNvPr id="2" name="Title 1">
-            <a:extLst>
-              <a:ext uri="{FF2B5EF4-FFF2-40B4-BE49-F238E27FC236}">
-                <a16:creationId xmlns:a16="http://schemas.microsoft.com/office/drawing/2014/main" id="{5149EF36-F9CE-4647-B169-9B37B99036E8}"/>
-              </a:ext>
-            </a:extLst>
-          </p:cNvPr>
-          <p:cNvSpPr>
+          <p:cNvPr id="136" name="Google Shape;136;p21"/>
+          <p:cNvSpPr txBox="1">
             <a:spLocks noGrp="1"/>
           </p:cNvSpPr>
           <p:nvPr>
-            <p:ph type="title"/>
+            <p:ph type="sldNum" idx="12"/>
           </p:nvPr>
         </p:nvSpPr>
         <p:spPr>
           <a:xfrm>
-            <a:off x="324416" y="303636"/>
-            <a:ext cx="10470584" cy="403187"/>
+            <a:off x="8610600" y="6356351"/>
+            <a:ext cx="2743200" cy="365200"/>
           </a:xfrm>
+          <a:prstGeom prst="rect">
+            <a:avLst/>
+          </a:prstGeom>
+          <a:noFill/>
+          <a:ln>
+            <a:noFill/>
+          </a:ln>
         </p:spPr>
         <p:txBody>
-          <a:bodyPr/>
-          <a:lstStyle/>
-          <a:p>
-            <a:r>
-              <a:rPr lang="en-US"/>
-              <a:t>Click to edit Master title style</a:t>
-            </a:r>
-          </a:p>
-        </p:txBody>
-      </p:sp>
-      <p:sp>
-        <p:nvSpPr>
-          <p:cNvPr id="3" name="Content Placeholder 2">
-            <a:extLst>
-              <a:ext uri="{FF2B5EF4-FFF2-40B4-BE49-F238E27FC236}">
-                <a16:creationId xmlns:a16="http://schemas.microsoft.com/office/drawing/2014/main" id="{2B1099A3-25D1-44D2-B255-78F583BF08A3}"/>
-              </a:ext>
-            </a:extLst>
-          </p:cNvPr>
-          <p:cNvSpPr>
-            <a:spLocks noGrp="1"/>
-          </p:cNvSpPr>
-          <p:nvPr>
-            <p:ph idx="1"/>
-          </p:nvPr>
-        </p:nvSpPr>
-        <p:spPr/>
-        <p:txBody>
-          <a:bodyPr/>
-          <a:lstStyle/>
-          <a:p>
-            <a:pPr lvl="0"/>
-            <a:r>
-              <a:rPr lang="en-US"/>
-              <a:t>Edit Master text styles</a:t>
-            </a:r>
-          </a:p>
-          <a:p>
-            <a:pPr lvl="1"/>
-            <a:r>
-              <a:rPr lang="en-US"/>
-              <a:t>Second level</a:t>
-            </a:r>
-          </a:p>
-          <a:p>
-            <a:pPr lvl="2"/>
-            <a:r>
-              <a:rPr lang="en-US"/>
-              <a:t>Third level</a:t>
-            </a:r>
-          </a:p>
-          <a:p>
-            <a:pPr lvl="3"/>
-            <a:r>
-              <a:rPr lang="en-US"/>
-              <a:t>Fourth level</a:t>
-            </a:r>
-          </a:p>
-        </p:txBody>
-      </p:sp>
-      <p:sp>
-        <p:nvSpPr>
-          <p:cNvPr id="4" name="Date Placeholder 3">
-            <a:extLst>
-              <a:ext uri="{FF2B5EF4-FFF2-40B4-BE49-F238E27FC236}">
-                <a16:creationId xmlns:a16="http://schemas.microsoft.com/office/drawing/2014/main" id="{4385C4C7-F6B0-48E4-ACEC-649CC0F49C64}"/>
-              </a:ext>
-            </a:extLst>
-          </p:cNvPr>
-          <p:cNvSpPr>
-            <a:spLocks noGrp="1"/>
-          </p:cNvSpPr>
-          <p:nvPr>
-            <p:ph type="dt" sz="half" idx="10"/>
-          </p:nvPr>
-        </p:nvSpPr>
-        <p:spPr/>
-        <p:txBody>
-          <a:bodyPr/>
-          <a:lstStyle/>
-          <a:p>
-            <a:fld id="{C426BC5F-09C1-43F9-92E4-3807667E7453}" type="datetimeFigureOut">
-              <a:rPr lang="en-US" smtClean="0"/>
-              <a:t>29-Aug-21</a:t>
+          <a:bodyPr spcFirstLastPara="1" wrap="square" lIns="68575" tIns="34275" rIns="68575" bIns="34275" anchor="t" anchorCtr="0">
+            <a:noAutofit/>
+          </a:bodyPr>
+          <a:lstStyle>
+            <a:lvl1pPr marL="0" marR="0" lvl="0" indent="0" algn="l" rtl="0">
+              <a:lnSpc>
+                <a:spcPct val="100000"/>
+              </a:lnSpc>
+              <a:spcBef>
+                <a:spcPts val="0"/>
+              </a:spcBef>
+              <a:spcAft>
+                <a:spcPts val="0"/>
+              </a:spcAft>
+              <a:buClr>
+                <a:srgbClr val="000000"/>
+              </a:buClr>
+              <a:buSzPts val="1400"/>
+              <a:buFont typeface="Arial"/>
+              <a:buNone/>
+              <a:defRPr sz="1867" b="0" i="0" u="none" strike="noStrike" cap="none">
+                <a:solidFill>
+                  <a:srgbClr val="000000"/>
+                </a:solidFill>
+                <a:latin typeface="Gotham Light" pitchFamily="50" charset="0"/>
+                <a:ea typeface="Gotham Light" pitchFamily="50" charset="0"/>
+                <a:cs typeface="Arial"/>
+                <a:sym typeface="Arial"/>
+              </a:defRPr>
+            </a:lvl1pPr>
+            <a:lvl2pPr marL="0" marR="0" lvl="1" indent="0" algn="l" rtl="0">
+              <a:lnSpc>
+                <a:spcPct val="100000"/>
+              </a:lnSpc>
+              <a:spcBef>
+                <a:spcPts val="0"/>
+              </a:spcBef>
+              <a:spcAft>
+                <a:spcPts val="0"/>
+              </a:spcAft>
+              <a:buClr>
+                <a:srgbClr val="000000"/>
+              </a:buClr>
+              <a:buSzPts val="1400"/>
+              <a:buFont typeface="Arial"/>
+              <a:buNone/>
+              <a:defRPr sz="1867" b="0" i="0" u="none" strike="noStrike" cap="none">
+                <a:solidFill>
+                  <a:srgbClr val="000000"/>
+                </a:solidFill>
+                <a:latin typeface="Arial"/>
+                <a:ea typeface="Arial"/>
+                <a:cs typeface="Arial"/>
+                <a:sym typeface="Arial"/>
+              </a:defRPr>
+            </a:lvl2pPr>
+            <a:lvl3pPr marL="0" marR="0" lvl="2" indent="0" algn="l" rtl="0">
+              <a:lnSpc>
+                <a:spcPct val="100000"/>
+              </a:lnSpc>
+              <a:spcBef>
+                <a:spcPts val="0"/>
+              </a:spcBef>
+              <a:spcAft>
+                <a:spcPts val="0"/>
+              </a:spcAft>
+              <a:buClr>
+                <a:srgbClr val="000000"/>
+              </a:buClr>
+              <a:buSzPts val="1400"/>
+              <a:buFont typeface="Arial"/>
+              <a:buNone/>
+              <a:defRPr sz="1867" b="0" i="0" u="none" strike="noStrike" cap="none">
+                <a:solidFill>
+                  <a:srgbClr val="000000"/>
+                </a:solidFill>
+                <a:latin typeface="Arial"/>
+                <a:ea typeface="Arial"/>
+                <a:cs typeface="Arial"/>
+                <a:sym typeface="Arial"/>
+              </a:defRPr>
+            </a:lvl3pPr>
+            <a:lvl4pPr marL="0" marR="0" lvl="3" indent="0" algn="l" rtl="0">
+              <a:lnSpc>
+                <a:spcPct val="100000"/>
+              </a:lnSpc>
+              <a:spcBef>
+                <a:spcPts val="0"/>
+              </a:spcBef>
+              <a:spcAft>
+                <a:spcPts val="0"/>
+              </a:spcAft>
+              <a:buClr>
+                <a:srgbClr val="000000"/>
+              </a:buClr>
+              <a:buSzPts val="1400"/>
+              <a:buFont typeface="Arial"/>
+              <a:buNone/>
+              <a:defRPr sz="1867" b="0" i="0" u="none" strike="noStrike" cap="none">
+                <a:solidFill>
+                  <a:srgbClr val="000000"/>
+                </a:solidFill>
+                <a:latin typeface="Arial"/>
+                <a:ea typeface="Arial"/>
+                <a:cs typeface="Arial"/>
+                <a:sym typeface="Arial"/>
+              </a:defRPr>
+            </a:lvl4pPr>
+            <a:lvl5pPr marL="0" marR="0" lvl="4" indent="0" algn="l" rtl="0">
+              <a:lnSpc>
+                <a:spcPct val="100000"/>
+              </a:lnSpc>
+              <a:spcBef>
+                <a:spcPts val="0"/>
+              </a:spcBef>
+              <a:spcAft>
+                <a:spcPts val="0"/>
+              </a:spcAft>
+              <a:buClr>
+                <a:srgbClr val="000000"/>
+              </a:buClr>
+              <a:buSzPts val="1400"/>
+              <a:buFont typeface="Arial"/>
+              <a:buNone/>
+              <a:defRPr sz="1867" b="0" i="0" u="none" strike="noStrike" cap="none">
+                <a:solidFill>
+                  <a:srgbClr val="000000"/>
+                </a:solidFill>
+                <a:latin typeface="Arial"/>
+                <a:ea typeface="Arial"/>
+                <a:cs typeface="Arial"/>
+                <a:sym typeface="Arial"/>
+              </a:defRPr>
+            </a:lvl5pPr>
+            <a:lvl6pPr marL="0" marR="0" lvl="5" indent="0" algn="l" rtl="0">
+              <a:lnSpc>
+                <a:spcPct val="100000"/>
+              </a:lnSpc>
+              <a:spcBef>
+                <a:spcPts val="0"/>
+              </a:spcBef>
+              <a:spcAft>
+                <a:spcPts val="0"/>
+              </a:spcAft>
+              <a:buClr>
+                <a:srgbClr val="000000"/>
+              </a:buClr>
+              <a:buSzPts val="1400"/>
+              <a:buFont typeface="Arial"/>
+              <a:buNone/>
+              <a:defRPr sz="1867" b="0" i="0" u="none" strike="noStrike" cap="none">
+                <a:solidFill>
+                  <a:srgbClr val="000000"/>
+                </a:solidFill>
+                <a:latin typeface="Arial"/>
+                <a:ea typeface="Arial"/>
+                <a:cs typeface="Arial"/>
+                <a:sym typeface="Arial"/>
+              </a:defRPr>
+            </a:lvl6pPr>
+            <a:lvl7pPr marL="0" marR="0" lvl="6" indent="0" algn="l" rtl="0">
+              <a:lnSpc>
+                <a:spcPct val="100000"/>
+              </a:lnSpc>
+              <a:spcBef>
+                <a:spcPts val="0"/>
+              </a:spcBef>
+              <a:spcAft>
+                <a:spcPts val="0"/>
+              </a:spcAft>
+              <a:buClr>
+                <a:srgbClr val="000000"/>
+              </a:buClr>
+              <a:buSzPts val="1400"/>
+              <a:buFont typeface="Arial"/>
+              <a:buNone/>
+              <a:defRPr sz="1867" b="0" i="0" u="none" strike="noStrike" cap="none">
+                <a:solidFill>
+                  <a:srgbClr val="000000"/>
+                </a:solidFill>
+                <a:latin typeface="Arial"/>
+                <a:ea typeface="Arial"/>
+                <a:cs typeface="Arial"/>
+                <a:sym typeface="Arial"/>
+              </a:defRPr>
+            </a:lvl7pPr>
+            <a:lvl8pPr marL="0" marR="0" lvl="7" indent="0" algn="l" rtl="0">
+              <a:lnSpc>
+                <a:spcPct val="100000"/>
+              </a:lnSpc>
+              <a:spcBef>
+                <a:spcPts val="0"/>
+              </a:spcBef>
+              <a:spcAft>
+                <a:spcPts val="0"/>
+              </a:spcAft>
+              <a:buClr>
+                <a:srgbClr val="000000"/>
+              </a:buClr>
+              <a:buSzPts val="1400"/>
+              <a:buFont typeface="Arial"/>
+              <a:buNone/>
+              <a:defRPr sz="1867" b="0" i="0" u="none" strike="noStrike" cap="none">
+                <a:solidFill>
+                  <a:srgbClr val="000000"/>
+                </a:solidFill>
+                <a:latin typeface="Arial"/>
+                <a:ea typeface="Arial"/>
+                <a:cs typeface="Arial"/>
+                <a:sym typeface="Arial"/>
+              </a:defRPr>
+            </a:lvl8pPr>
+            <a:lvl9pPr marL="0" marR="0" lvl="8" indent="0" algn="l" rtl="0">
+              <a:lnSpc>
+                <a:spcPct val="100000"/>
+              </a:lnSpc>
+              <a:spcBef>
+                <a:spcPts val="0"/>
+              </a:spcBef>
+              <a:spcAft>
+                <a:spcPts val="0"/>
+              </a:spcAft>
+              <a:buClr>
+                <a:srgbClr val="000000"/>
+              </a:buClr>
+              <a:buSzPts val="1400"/>
+              <a:buFont typeface="Arial"/>
+              <a:buNone/>
+              <a:defRPr sz="1867" b="0" i="0" u="none" strike="noStrike" cap="none">
+                <a:solidFill>
+                  <a:srgbClr val="000000"/>
+                </a:solidFill>
+                <a:latin typeface="Arial"/>
+                <a:ea typeface="Arial"/>
+                <a:cs typeface="Arial"/>
+                <a:sym typeface="Arial"/>
+              </a:defRPr>
+            </a:lvl9pPr>
+          </a:lstStyle>
+          <a:p>
+            <a:fld id="{00000000-1234-1234-1234-123412341234}" type="slidenum">
+              <a:rPr lang="en" smtClean="0"/>
+              <a:pPr/>
+              <a:t>‹#›</a:t>
             </a:fld>
-            <a:endParaRPr lang="en-US"/>
-          </a:p>
-        </p:txBody>
-      </p:sp>
-      <p:sp>
-        <p:nvSpPr>
-          <p:cNvPr id="5" name="Footer Placeholder 4">
-            <a:extLst>
-              <a:ext uri="{FF2B5EF4-FFF2-40B4-BE49-F238E27FC236}">
-                <a16:creationId xmlns:a16="http://schemas.microsoft.com/office/drawing/2014/main" id="{ECDAD504-107D-4E14-8686-4209B335C8D1}"/>
-              </a:ext>
-            </a:extLst>
-          </p:cNvPr>
-          <p:cNvSpPr>
-            <a:spLocks noGrp="1"/>
-          </p:cNvSpPr>
-          <p:nvPr>
-            <p:ph type="ftr" sz="quarter" idx="11"/>
-          </p:nvPr>
-        </p:nvSpPr>
-        <p:spPr/>
-        <p:txBody>
-          <a:bodyPr/>
-          <a:lstStyle/>
-          <a:p>
-            <a:endParaRPr lang="en-US"/>
+            <a:endParaRPr lang="en"/>
           </a:p>
         </p:txBody>
       </p:sp>
     </p:spTree>
     <p:extLst>
       <p:ext uri="{BB962C8B-B14F-4D97-AF65-F5344CB8AC3E}">
-        <p14:creationId xmlns:p14="http://schemas.microsoft.com/office/powerpoint/2010/main" val="2721967463"/>
+        <p14:creationId xmlns:p14="http://schemas.microsoft.com/office/powerpoint/2010/main" val="3450435108"/>
       </p:ext>
     </p:extLst>
   </p:cSld>
@@ -5361,7 +3896,7 @@
           </p:cNvGraphicFramePr>
           <p:nvPr userDrawn="1">
             <p:custDataLst>
-              <p:tags r:id="rId8"/>
+              <p:tags r:id="rId6"/>
             </p:custDataLst>
           </p:nvPr>
         </p:nvGraphicFramePr>
@@ -5373,12 +3908,12 @@
           <a:graphicData uri="http://schemas.openxmlformats.org/presentationml/2006/ole">
             <mc:AlternateContent xmlns:mc="http://schemas.openxmlformats.org/markup-compatibility/2006">
               <mc:Choice xmlns:v="urn:schemas-microsoft-com:vml" Requires="v">
-                <p:oleObj name="think-cell Slide" r:id="rId9" imgW="425" imgH="426" progId="TCLayout.ActiveDocument.1">
+                <p:oleObj spid="_x0000_s6147" name="think-cell Slide" r:id="rId8" imgW="425" imgH="426" progId="TCLayout.ActiveDocument.1">
                   <p:embed/>
                 </p:oleObj>
               </mc:Choice>
               <mc:Fallback>
-                <p:oleObj name="think-cell Slide" r:id="rId9" imgW="425" imgH="426" progId="TCLayout.ActiveDocument.1">
+                <p:oleObj name="think-cell Slide" r:id="rId8" imgW="425" imgH="426" progId="TCLayout.ActiveDocument.1">
                   <p:embed/>
                   <p:pic>
                     <p:nvPicPr>
@@ -5387,7 +3922,7 @@
                       <p:nvPr/>
                     </p:nvPicPr>
                     <p:blipFill>
-                      <a:blip r:embed="rId10"/>
+                      <a:blip r:embed="rId9"/>
                       <a:stretch>
                         <a:fillRect/>
                       </a:stretch>
@@ -5408,6 +3943,63 @@
           </a:graphicData>
         </a:graphic>
       </p:graphicFrame>
+      <p:sp>
+        <p:nvSpPr>
+          <p:cNvPr id="7" name="Rectangle 6" hidden="1">
+            <a:extLst>
+              <a:ext uri="{FF2B5EF4-FFF2-40B4-BE49-F238E27FC236}">
+                <a16:creationId xmlns:a16="http://schemas.microsoft.com/office/drawing/2014/main" id="{B4B9995B-F1D1-41E0-B428-B93E0C99B409}"/>
+              </a:ext>
+            </a:extLst>
+          </p:cNvPr>
+          <p:cNvSpPr/>
+          <p:nvPr userDrawn="1">
+            <p:custDataLst>
+              <p:tags r:id="rId7"/>
+            </p:custDataLst>
+          </p:nvPr>
+        </p:nvSpPr>
+        <p:spPr>
+          <a:xfrm>
+            <a:off x="0" y="0"/>
+            <a:ext cx="158750" cy="158750"/>
+          </a:xfrm>
+          <a:prstGeom prst="rect">
+            <a:avLst/>
+          </a:prstGeom>
+        </p:spPr>
+        <p:style>
+          <a:lnRef idx="2">
+            <a:schemeClr val="accent1">
+              <a:shade val="50000"/>
+            </a:schemeClr>
+          </a:lnRef>
+          <a:fillRef idx="1">
+            <a:schemeClr val="accent1"/>
+          </a:fillRef>
+          <a:effectRef idx="0">
+            <a:schemeClr val="accent1"/>
+          </a:effectRef>
+          <a:fontRef idx="minor">
+            <a:schemeClr val="lt1"/>
+          </a:fontRef>
+        </p:style>
+        <p:txBody>
+          <a:bodyPr wrap="none" lIns="0" tIns="0" rIns="0" bIns="0" numCol="1" spcCol="0" rtlCol="0" anchor="ctr" anchorCtr="0">
+            <a:noAutofit/>
+          </a:bodyPr>
+          <a:lstStyle/>
+          <a:p>
+            <a:pPr marL="0" lvl="0" indent="0" algn="ctr"/>
+            <a:endParaRPr lang="en-US" sz="2800" b="1" i="0" baseline="0">
+              <a:latin typeface="Gotham Light" panose="02000603030000020004"/>
+              <a:ea typeface="+mj-ea"/>
+              <a:cs typeface="+mj-cs"/>
+              <a:sym typeface="Gotham Light" panose="02000603030000020004"/>
+            </a:endParaRPr>
+          </a:p>
+        </p:txBody>
+      </p:sp>
       <p:sp>
         <p:nvSpPr>
           <p:cNvPr id="20" name="Arrow: Pentagon 19">
@@ -5902,55 +4494,18 @@
           </a:p>
         </p:txBody>
       </p:sp>
-      <p:pic>
-        <p:nvPicPr>
-          <p:cNvPr id="13" name="Picture 12">
-            <a:extLst>
-              <a:ext uri="{FF2B5EF4-FFF2-40B4-BE49-F238E27FC236}">
-                <a16:creationId xmlns:a16="http://schemas.microsoft.com/office/drawing/2014/main" id="{23304A6A-D15B-47E1-B072-1C47E2C76553}"/>
-              </a:ext>
-            </a:extLst>
-          </p:cNvPr>
-          <p:cNvPicPr/>
-          <p:nvPr userDrawn="1"/>
-        </p:nvPicPr>
-        <p:blipFill>
-          <a:blip r:embed="rId11" cstate="print">
-            <a:extLst>
-              <a:ext uri="{28A0092B-C50C-407E-A947-70E740481C1C}">
-                <a14:useLocalDpi xmlns:a14="http://schemas.microsoft.com/office/drawing/2010/main" val="0"/>
-              </a:ext>
-            </a:extLst>
-          </a:blip>
-          <a:stretch>
-            <a:fillRect/>
-          </a:stretch>
-        </p:blipFill>
-        <p:spPr>
-          <a:xfrm>
-            <a:off x="10755433" y="31710"/>
-            <a:ext cx="1428750" cy="596265"/>
-          </a:xfrm>
-          <a:prstGeom prst="rect">
-            <a:avLst/>
-          </a:prstGeom>
-        </p:spPr>
-      </p:pic>
     </p:spTree>
     <p:extLst>
       <p:ext uri="{BB962C8B-B14F-4D97-AF65-F5344CB8AC3E}">
-        <p14:creationId xmlns:p14="http://schemas.microsoft.com/office/powerpoint/2010/main" val="2928327199"/>
+        <p14:creationId xmlns:p14="http://schemas.microsoft.com/office/powerpoint/2010/main" val="2415707721"/>
       </p:ext>
     </p:extLst>
   </p:cSld>
   <p:clrMap bg1="lt1" tx1="dk1" bg2="lt2" tx2="dk2" accent1="accent1" accent2="accent2" accent3="accent3" accent4="accent4" accent5="accent5" accent6="accent6" hlink="hlink" folHlink="folHlink"/>
   <p:sldLayoutIdLst>
-    <p:sldLayoutId id="2147483661" r:id="rId1"/>
-    <p:sldLayoutId id="2147483662" r:id="rId2"/>
-    <p:sldLayoutId id="2147483663" r:id="rId3"/>
-    <p:sldLayoutId id="2147483664" r:id="rId4"/>
-    <p:sldLayoutId id="2147483665" r:id="rId5"/>
-    <p:sldLayoutId id="2147483667" r:id="rId6"/>
+    <p:sldLayoutId id="2147483669" r:id="rId1"/>
+    <p:sldLayoutId id="2147483674" r:id="rId2"/>
+    <p:sldLayoutId id="2147483673" r:id="rId3"/>
   </p:sldLayoutIdLst>
   <p:txStyles>
     <p:titleStyle>
@@ -6292,12 +4847,12 @@
           <a:graphicData uri="http://schemas.openxmlformats.org/presentationml/2006/ole">
             <mc:AlternateContent xmlns:mc="http://schemas.openxmlformats.org/markup-compatibility/2006">
               <mc:Choice xmlns:v="urn:schemas-microsoft-com:vml" Requires="v">
-                <p:oleObj name="think-cell Slide" r:id="rId8" imgW="425" imgH="426" progId="TCLayout.ActiveDocument.1">
+                <p:oleObj spid="_x0000_s8195" name="think-cell Slide" r:id="rId7" imgW="425" imgH="426" progId="TCLayout.ActiveDocument.1">
                   <p:embed/>
                 </p:oleObj>
               </mc:Choice>
               <mc:Fallback>
-                <p:oleObj name="think-cell Slide" r:id="rId8" imgW="425" imgH="426" progId="TCLayout.ActiveDocument.1">
+                <p:oleObj name="think-cell Slide" r:id="rId7" imgW="425" imgH="426" progId="TCLayout.ActiveDocument.1">
                   <p:embed/>
                   <p:pic>
                     <p:nvPicPr>
@@ -6306,7 +4861,7 @@
                       <p:nvPr/>
                     </p:nvPicPr>
                     <p:blipFill>
-                      <a:blip r:embed="rId9"/>
+                      <a:blip r:embed="rId8"/>
                       <a:stretch>
                         <a:fillRect/>
                       </a:stretch>
@@ -6327,63 +4882,6 @@
           </a:graphicData>
         </a:graphic>
       </p:graphicFrame>
-      <p:sp>
-        <p:nvSpPr>
-          <p:cNvPr id="7" name="Rectangle 6" hidden="1">
-            <a:extLst>
-              <a:ext uri="{FF2B5EF4-FFF2-40B4-BE49-F238E27FC236}">
-                <a16:creationId xmlns:a16="http://schemas.microsoft.com/office/drawing/2014/main" id="{B4B9995B-F1D1-41E0-B428-B93E0C99B409}"/>
-              </a:ext>
-            </a:extLst>
-          </p:cNvPr>
-          <p:cNvSpPr/>
-          <p:nvPr userDrawn="1">
-            <p:custDataLst>
-              <p:tags r:id="rId7"/>
-            </p:custDataLst>
-          </p:nvPr>
-        </p:nvSpPr>
-        <p:spPr>
-          <a:xfrm>
-            <a:off x="0" y="0"/>
-            <a:ext cx="158750" cy="158750"/>
-          </a:xfrm>
-          <a:prstGeom prst="rect">
-            <a:avLst/>
-          </a:prstGeom>
-        </p:spPr>
-        <p:style>
-          <a:lnRef idx="2">
-            <a:schemeClr val="accent1">
-              <a:shade val="50000"/>
-            </a:schemeClr>
-          </a:lnRef>
-          <a:fillRef idx="1">
-            <a:schemeClr val="accent1"/>
-          </a:fillRef>
-          <a:effectRef idx="0">
-            <a:schemeClr val="accent1"/>
-          </a:effectRef>
-          <a:fontRef idx="minor">
-            <a:schemeClr val="lt1"/>
-          </a:fontRef>
-        </p:style>
-        <p:txBody>
-          <a:bodyPr wrap="none" lIns="0" tIns="0" rIns="0" bIns="0" numCol="1" spcCol="0" rtlCol="0" anchor="ctr" anchorCtr="0">
-            <a:noAutofit/>
-          </a:bodyPr>
-          <a:lstStyle/>
-          <a:p>
-            <a:pPr marL="0" lvl="0" indent="0" algn="ctr"/>
-            <a:endParaRPr lang="en-US" sz="2800" b="1" i="0" baseline="0">
-              <a:latin typeface="Gotham Light" panose="02000603030000020004"/>
-              <a:ea typeface="+mj-ea"/>
-              <a:cs typeface="+mj-cs"/>
-              <a:sym typeface="Gotham Light" panose="02000603030000020004"/>
-            </a:endParaRPr>
-          </a:p>
-        </p:txBody>
-      </p:sp>
       <p:sp>
         <p:nvSpPr>
           <p:cNvPr id="20" name="Arrow: Pentagon 19">
@@ -6878,53 +5376,18 @@
           </a:p>
         </p:txBody>
       </p:sp>
-      <p:pic>
-        <p:nvPicPr>
-          <p:cNvPr id="14" name="Picture 13">
-            <a:extLst>
-              <a:ext uri="{FF2B5EF4-FFF2-40B4-BE49-F238E27FC236}">
-                <a16:creationId xmlns:a16="http://schemas.microsoft.com/office/drawing/2014/main" id="{FDFCD0C7-445F-4A14-9C86-5CF981271CEE}"/>
-              </a:ext>
-            </a:extLst>
-          </p:cNvPr>
-          <p:cNvPicPr/>
-          <p:nvPr userDrawn="1"/>
-        </p:nvPicPr>
-        <p:blipFill>
-          <a:blip r:embed="rId10" cstate="print">
-            <a:extLst>
-              <a:ext uri="{28A0092B-C50C-407E-A947-70E740481C1C}">
-                <a14:useLocalDpi xmlns:a14="http://schemas.microsoft.com/office/drawing/2010/main" val="0"/>
-              </a:ext>
-            </a:extLst>
-          </a:blip>
-          <a:stretch>
-            <a:fillRect/>
-          </a:stretch>
-        </p:blipFill>
-        <p:spPr>
-          <a:xfrm>
-            <a:off x="10736027" y="18414"/>
-            <a:ext cx="1428750" cy="596265"/>
-          </a:xfrm>
-          <a:prstGeom prst="rect">
-            <a:avLst/>
-          </a:prstGeom>
-        </p:spPr>
-      </p:pic>
     </p:spTree>
     <p:extLst>
       <p:ext uri="{BB962C8B-B14F-4D97-AF65-F5344CB8AC3E}">
-        <p14:creationId xmlns:p14="http://schemas.microsoft.com/office/powerpoint/2010/main" val="2415707721"/>
+        <p14:creationId xmlns:p14="http://schemas.microsoft.com/office/powerpoint/2010/main" val="782070537"/>
       </p:ext>
     </p:extLst>
   </p:cSld>
   <p:clrMap bg1="lt1" tx1="dk1" bg2="lt2" tx2="dk2" accent1="accent1" accent2="accent2" accent3="accent3" accent4="accent4" accent5="accent5" accent6="accent6" hlink="hlink" folHlink="folHlink"/>
   <p:sldLayoutIdLst>
-    <p:sldLayoutId id="2147483669" r:id="rId1"/>
-    <p:sldLayoutId id="2147483674" r:id="rId2"/>
-    <p:sldLayoutId id="2147483671" r:id="rId3"/>
-    <p:sldLayoutId id="2147483673" r:id="rId4"/>
+    <p:sldLayoutId id="2147483676" r:id="rId1"/>
+    <p:sldLayoutId id="2147483677" r:id="rId2"/>
+    <p:sldLayoutId id="2147483678" r:id="rId3"/>
   </p:sldLayoutIdLst>
   <p:txStyles>
     <p:titleStyle>
@@ -7264,21 +5727,17 @@
       </p:pic>
       <p:sp>
         <p:nvSpPr>
-          <p:cNvPr id="4" name="Google Shape;40;p5">
-            <a:extLst>
-              <a:ext uri="{FF2B5EF4-FFF2-40B4-BE49-F238E27FC236}">
-                <a16:creationId xmlns:a16="http://schemas.microsoft.com/office/drawing/2014/main" id="{C9607DE2-A059-4BE3-9904-5486CE512E28}"/>
-              </a:ext>
-            </a:extLst>
-          </p:cNvPr>
+          <p:cNvPr id="40" name="Google Shape;40;p5"/>
           <p:cNvSpPr txBox="1">
-            <a:spLocks/>
+            <a:spLocks noGrp="1"/>
           </p:cNvSpPr>
-          <p:nvPr/>
+          <p:nvPr>
+            <p:ph type="ctrTitle" idx="4294967295"/>
+          </p:nvPr>
         </p:nvSpPr>
         <p:spPr>
           <a:xfrm>
-            <a:off x="34416" y="2246669"/>
+            <a:off x="0" y="2005781"/>
             <a:ext cx="5530645" cy="1652451"/>
           </a:xfrm>
           <a:prstGeom prst="rect">
@@ -7290,28 +5749,10 @@
           </a:ln>
         </p:spPr>
         <p:txBody>
-          <a:bodyPr spcFirstLastPara="1" vert="horz" wrap="square" lIns="15225" tIns="7600" rIns="15225" bIns="7600" rtlCol="0" anchor="b" anchorCtr="0">
+          <a:bodyPr spcFirstLastPara="1" wrap="square" lIns="15225" tIns="7600" rIns="15225" bIns="7600" anchor="b" anchorCtr="0">
             <a:noAutofit/>
           </a:bodyPr>
-          <a:lstStyle>
-            <a:lvl1pPr algn="l" defTabSz="914400" rtl="0" eaLnBrk="1" latinLnBrk="0" hangingPunct="1">
-              <a:lnSpc>
-                <a:spcPct val="90000"/>
-              </a:lnSpc>
-              <a:spcBef>
-                <a:spcPct val="0"/>
-              </a:spcBef>
-              <a:buNone/>
-              <a:defRPr sz="2800" b="1" kern="1200">
-                <a:solidFill>
-                  <a:srgbClr val="423C89"/>
-                </a:solidFill>
-                <a:latin typeface="Gotham Light" panose="02000603030000020004" pitchFamily="2" charset="0"/>
-                <a:ea typeface="+mj-ea"/>
-                <a:cs typeface="+mj-cs"/>
-              </a:defRPr>
-            </a:lvl1pPr>
-          </a:lstStyle>
+          <a:lstStyle/>
           <a:p>
             <a:pPr algn="ctr"/>
             <a:r>
@@ -7375,8 +5816,8 @@
         </p:nvSpPr>
         <p:spPr>
           <a:xfrm>
-            <a:off x="392054" y="6233214"/>
-            <a:ext cx="11407893" cy="624786"/>
+            <a:off x="6647146" y="1791222"/>
+            <a:ext cx="4563648" cy="2163871"/>
           </a:xfrm>
         </p:spPr>
         <p:txBody>
@@ -7682,13 +6123,13 @@
   <p:clrMapOvr>
     <a:masterClrMapping/>
   </p:clrMapOvr>
-  <mc:AlternateContent xmlns:mc="http://schemas.openxmlformats.org/markup-compatibility/2006">
-    <mc:Choice xmlns:p14="http://schemas.microsoft.com/office/powerpoint/2010/main" Requires="p14">
+  <mc:AlternateContent xmlns:mc="http://schemas.openxmlformats.org/markup-compatibility/2006" xmlns:p14="http://schemas.microsoft.com/office/powerpoint/2010/main">
+    <mc:Choice Requires="p14">
       <p:transition spd="med" p14:dur="700">
         <p:fade/>
       </p:transition>
     </mc:Choice>
-    <mc:Fallback>
+    <mc:Fallback xmlns="">
       <p:transition spd="med">
         <p:fade/>
       </p:transition>
@@ -7897,13 +6338,13 @@
   <p:clrMapOvr>
     <a:masterClrMapping/>
   </p:clrMapOvr>
-  <mc:AlternateContent xmlns:mc="http://schemas.openxmlformats.org/markup-compatibility/2006">
-    <mc:Choice xmlns:p14="http://schemas.microsoft.com/office/powerpoint/2010/main" Requires="p14">
+  <mc:AlternateContent xmlns:mc="http://schemas.openxmlformats.org/markup-compatibility/2006" xmlns:p14="http://schemas.microsoft.com/office/powerpoint/2010/main">
+    <mc:Choice Requires="p14">
       <p:transition spd="med" p14:dur="700">
         <p:fade/>
       </p:transition>
     </mc:Choice>
-    <mc:Fallback>
+    <mc:Fallback xmlns="">
       <p:transition spd="med">
         <p:fade/>
       </p:transition>
@@ -8082,13 +6523,13 @@
   <p:clrMapOvr>
     <a:masterClrMapping/>
   </p:clrMapOvr>
-  <mc:AlternateContent xmlns:mc="http://schemas.openxmlformats.org/markup-compatibility/2006">
-    <mc:Choice xmlns:p14="http://schemas.microsoft.com/office/powerpoint/2010/main" Requires="p14">
+  <mc:AlternateContent xmlns:mc="http://schemas.openxmlformats.org/markup-compatibility/2006" xmlns:p14="http://schemas.microsoft.com/office/powerpoint/2010/main">
+    <mc:Choice Requires="p14">
       <p:transition spd="med" p14:dur="700">
         <p:fade/>
       </p:transition>
     </mc:Choice>
-    <mc:Fallback>
+    <mc:Fallback xmlns="">
       <p:transition spd="med">
         <p:fade/>
       </p:transition>
@@ -8290,13 +6731,13 @@
   <p:clrMapOvr>
     <a:masterClrMapping/>
   </p:clrMapOvr>
-  <mc:AlternateContent xmlns:mc="http://schemas.openxmlformats.org/markup-compatibility/2006">
-    <mc:Choice xmlns:p14="http://schemas.microsoft.com/office/powerpoint/2010/main" Requires="p14">
+  <mc:AlternateContent xmlns:mc="http://schemas.openxmlformats.org/markup-compatibility/2006" xmlns:p14="http://schemas.microsoft.com/office/powerpoint/2010/main">
+    <mc:Choice Requires="p14">
       <p:transition spd="med" p14:dur="700">
         <p:fade/>
       </p:transition>
     </mc:Choice>
-    <mc:Fallback>
+    <mc:Fallback xmlns="">
       <p:transition spd="med">
         <p:fade/>
       </p:transition>
@@ -8473,13 +6914,13 @@
   <p:clrMapOvr>
     <a:masterClrMapping/>
   </p:clrMapOvr>
-  <mc:AlternateContent xmlns:mc="http://schemas.openxmlformats.org/markup-compatibility/2006">
-    <mc:Choice xmlns:p14="http://schemas.microsoft.com/office/powerpoint/2010/main" Requires="p14">
+  <mc:AlternateContent xmlns:mc="http://schemas.openxmlformats.org/markup-compatibility/2006" xmlns:p14="http://schemas.microsoft.com/office/powerpoint/2010/main">
+    <mc:Choice Requires="p14">
       <p:transition spd="med" p14:dur="700">
         <p:fade/>
       </p:transition>
     </mc:Choice>
-    <mc:Fallback>
+    <mc:Fallback xmlns="">
       <p:transition spd="med">
         <p:fade/>
       </p:transition>
@@ -8659,13 +7100,13 @@
   <p:clrMapOvr>
     <a:masterClrMapping/>
   </p:clrMapOvr>
-  <mc:AlternateContent xmlns:mc="http://schemas.openxmlformats.org/markup-compatibility/2006">
-    <mc:Choice xmlns:p14="http://schemas.microsoft.com/office/powerpoint/2010/main" Requires="p14">
+  <mc:AlternateContent xmlns:mc="http://schemas.openxmlformats.org/markup-compatibility/2006" xmlns:p14="http://schemas.microsoft.com/office/powerpoint/2010/main">
+    <mc:Choice Requires="p14">
       <p:transition spd="med" p14:dur="700">
         <p:fade/>
       </p:transition>
     </mc:Choice>
-    <mc:Fallback>
+    <mc:Fallback xmlns="">
       <p:transition spd="med">
         <p:fade/>
       </p:transition>
@@ -8760,7 +7201,7 @@
 
 <file path=ppt/tags/tag2.xml><?xml version="1.0" encoding="utf-8"?>
 <p:tagLst xmlns:a="http://schemas.openxmlformats.org/drawingml/2006/main" xmlns:r="http://schemas.openxmlformats.org/officeDocument/2006/relationships" xmlns:p="http://schemas.openxmlformats.org/presentationml/2006/main">
-  <p:tag name="THINKCELLSHAPEDONOTDELETE" val="thinkcellActiveDocDoNotDelete"/>
+  <p:tag name="THINKCELLSHAPEDONOTDELETE" val="tUoffiZR5AfClmeIKvM80OQ"/>
 </p:tagLst>
 </file>
 
@@ -8782,226 +7223,7 @@
 </p:tagLst>
 </file>
 
-<file path=ppt/tags/tag6.xml><?xml version="1.0" encoding="utf-8"?>
-<p:tagLst xmlns:a="http://schemas.openxmlformats.org/drawingml/2006/main" xmlns:r="http://schemas.openxmlformats.org/officeDocument/2006/relationships" xmlns:p="http://schemas.openxmlformats.org/presentationml/2006/main">
-  <p:tag name="THINKCELLSHAPEDONOTDELETE" val="tUoffiZR5AfClmeIKvM80OQ"/>
-</p:tagLst>
-</file>
-
-<file path=ppt/tags/tag7.xml><?xml version="1.0" encoding="utf-8"?>
-<p:tagLst xmlns:a="http://schemas.openxmlformats.org/drawingml/2006/main" xmlns:r="http://schemas.openxmlformats.org/officeDocument/2006/relationships" xmlns:p="http://schemas.openxmlformats.org/presentationml/2006/main">
-  <p:tag name="THINKCELLSHAPEDONOTDELETE" val="thinkcellActiveDocDoNotDelete"/>
-</p:tagLst>
-</file>
-
-<file path=ppt/tags/tag8.xml><?xml version="1.0" encoding="utf-8"?>
-<p:tagLst xmlns:a="http://schemas.openxmlformats.org/drawingml/2006/main" xmlns:r="http://schemas.openxmlformats.org/officeDocument/2006/relationships" xmlns:p="http://schemas.openxmlformats.org/presentationml/2006/main">
-  <p:tag name="THINKCELLSHAPEDONOTDELETE" val="thinkcellActiveDocDoNotDelete"/>
-</p:tagLst>
-</file>
-
 <file path=ppt/theme/theme1.xml><?xml version="1.0" encoding="utf-8"?>
-<a:theme xmlns:a="http://schemas.openxmlformats.org/drawingml/2006/main" name="1_Office Theme">
-  <a:themeElements>
-    <a:clrScheme name="Custom 2">
-      <a:dk1>
-        <a:sysClr val="windowText" lastClr="000000"/>
-      </a:dk1>
-      <a:lt1>
-        <a:sysClr val="window" lastClr="FFFFFF"/>
-      </a:lt1>
-      <a:dk2>
-        <a:srgbClr val="595959"/>
-      </a:dk2>
-      <a:lt2>
-        <a:srgbClr val="E7E6E6"/>
-      </a:lt2>
-      <a:accent1>
-        <a:srgbClr val="165C7D"/>
-      </a:accent1>
-      <a:accent2>
-        <a:srgbClr val="93C90E"/>
-      </a:accent2>
-      <a:accent3>
-        <a:srgbClr val="77C5D5"/>
-      </a:accent3>
-      <a:accent4>
-        <a:srgbClr val="F39130"/>
-      </a:accent4>
-      <a:accent5>
-        <a:srgbClr val="919191"/>
-      </a:accent5>
-      <a:accent6>
-        <a:srgbClr val="F2F2F2"/>
-      </a:accent6>
-      <a:hlink>
-        <a:srgbClr val="165C7D"/>
-      </a:hlink>
-      <a:folHlink>
-        <a:srgbClr val="954F72"/>
-      </a:folHlink>
-    </a:clrScheme>
-    <a:fontScheme name="Custom 10">
-      <a:majorFont>
-        <a:latin typeface="Gotham Light"/>
-        <a:ea typeface=""/>
-        <a:cs typeface=""/>
-      </a:majorFont>
-      <a:minorFont>
-        <a:latin typeface="Gotham Light"/>
-        <a:ea typeface=""/>
-        <a:cs typeface=""/>
-      </a:minorFont>
-    </a:fontScheme>
-    <a:fmtScheme name="Office">
-      <a:fillStyleLst>
-        <a:solidFill>
-          <a:schemeClr val="phClr"/>
-        </a:solidFill>
-        <a:gradFill rotWithShape="1">
-          <a:gsLst>
-            <a:gs pos="0">
-              <a:schemeClr val="phClr">
-                <a:lumMod val="110000"/>
-                <a:satMod val="105000"/>
-                <a:tint val="67000"/>
-              </a:schemeClr>
-            </a:gs>
-            <a:gs pos="50000">
-              <a:schemeClr val="phClr">
-                <a:lumMod val="105000"/>
-                <a:satMod val="103000"/>
-                <a:tint val="73000"/>
-              </a:schemeClr>
-            </a:gs>
-            <a:gs pos="100000">
-              <a:schemeClr val="phClr">
-                <a:lumMod val="105000"/>
-                <a:satMod val="109000"/>
-                <a:tint val="81000"/>
-              </a:schemeClr>
-            </a:gs>
-          </a:gsLst>
-          <a:lin ang="5400000" scaled="0"/>
-        </a:gradFill>
-        <a:gradFill rotWithShape="1">
-          <a:gsLst>
-            <a:gs pos="0">
-              <a:schemeClr val="phClr">
-                <a:satMod val="103000"/>
-                <a:lumMod val="102000"/>
-                <a:tint val="94000"/>
-              </a:schemeClr>
-            </a:gs>
-            <a:gs pos="50000">
-              <a:schemeClr val="phClr">
-                <a:satMod val="110000"/>
-                <a:lumMod val="100000"/>
-                <a:shade val="100000"/>
-              </a:schemeClr>
-            </a:gs>
-            <a:gs pos="100000">
-              <a:schemeClr val="phClr">
-                <a:lumMod val="99000"/>
-                <a:satMod val="120000"/>
-                <a:shade val="78000"/>
-              </a:schemeClr>
-            </a:gs>
-          </a:gsLst>
-          <a:lin ang="5400000" scaled="0"/>
-        </a:gradFill>
-      </a:fillStyleLst>
-      <a:lnStyleLst>
-        <a:ln w="6350" cap="flat" cmpd="sng" algn="ctr">
-          <a:solidFill>
-            <a:schemeClr val="phClr"/>
-          </a:solidFill>
-          <a:prstDash val="solid"/>
-          <a:miter lim="800000"/>
-        </a:ln>
-        <a:ln w="12700" cap="flat" cmpd="sng" algn="ctr">
-          <a:solidFill>
-            <a:schemeClr val="phClr"/>
-          </a:solidFill>
-          <a:prstDash val="solid"/>
-          <a:miter lim="800000"/>
-        </a:ln>
-        <a:ln w="19050" cap="flat" cmpd="sng" algn="ctr">
-          <a:solidFill>
-            <a:schemeClr val="phClr"/>
-          </a:solidFill>
-          <a:prstDash val="solid"/>
-          <a:miter lim="800000"/>
-        </a:ln>
-      </a:lnStyleLst>
-      <a:effectStyleLst>
-        <a:effectStyle>
-          <a:effectLst/>
-        </a:effectStyle>
-        <a:effectStyle>
-          <a:effectLst/>
-        </a:effectStyle>
-        <a:effectStyle>
-          <a:effectLst>
-            <a:outerShdw blurRad="57150" dist="19050" dir="5400000" algn="ctr" rotWithShape="0">
-              <a:srgbClr val="000000">
-                <a:alpha val="63000"/>
-              </a:srgbClr>
-            </a:outerShdw>
-          </a:effectLst>
-        </a:effectStyle>
-      </a:effectStyleLst>
-      <a:bgFillStyleLst>
-        <a:solidFill>
-          <a:schemeClr val="phClr"/>
-        </a:solidFill>
-        <a:solidFill>
-          <a:schemeClr val="phClr">
-            <a:tint val="95000"/>
-            <a:satMod val="170000"/>
-          </a:schemeClr>
-        </a:solidFill>
-        <a:gradFill rotWithShape="1">
-          <a:gsLst>
-            <a:gs pos="0">
-              <a:schemeClr val="phClr">
-                <a:tint val="93000"/>
-                <a:satMod val="150000"/>
-                <a:shade val="98000"/>
-                <a:lumMod val="102000"/>
-              </a:schemeClr>
-            </a:gs>
-            <a:gs pos="50000">
-              <a:schemeClr val="phClr">
-                <a:tint val="98000"/>
-                <a:satMod val="130000"/>
-                <a:shade val="90000"/>
-                <a:lumMod val="103000"/>
-              </a:schemeClr>
-            </a:gs>
-            <a:gs pos="100000">
-              <a:schemeClr val="phClr">
-                <a:shade val="63000"/>
-                <a:satMod val="120000"/>
-              </a:schemeClr>
-            </a:gs>
-          </a:gsLst>
-          <a:lin ang="5400000" scaled="0"/>
-        </a:gradFill>
-      </a:bgFillStyleLst>
-    </a:fmtScheme>
-  </a:themeElements>
-  <a:objectDefaults/>
-  <a:extraClrSchemeLst/>
-  <a:extLst>
-    <a:ext uri="{05A4C25C-085E-4340-85A3-A5531E510DB2}">
-      <thm15:themeFamily xmlns:thm15="http://schemas.microsoft.com/office/thememl/2012/main" name="Office Theme" id="{62F939B6-93AF-4DB8-9C6B-D6C7DFDC589F}" vid="{4A3C46E8-61CC-4603-A589-7422A47A8E4A}"/>
-    </a:ext>
-  </a:extLst>
-</a:theme>
-</file>
-
-<file path=ppt/theme/theme2.xml><?xml version="1.0" encoding="utf-8"?>
 <a:theme xmlns:a="http://schemas.openxmlformats.org/drawingml/2006/main" name="2_Office Theme">
   <a:themeElements>
     <a:clrScheme name="Custom 2">
@@ -9234,6 +7456,207 @@
       </a:lstStyle>
     </a:txDef>
   </a:objectDefaults>
+  <a:extraClrSchemeLst/>
+  <a:extLst>
+    <a:ext uri="{05A4C25C-085E-4340-85A3-A5531E510DB2}">
+      <thm15:themeFamily xmlns:thm15="http://schemas.microsoft.com/office/thememl/2012/main" name="Office Theme" id="{62F939B6-93AF-4DB8-9C6B-D6C7DFDC589F}" vid="{4A3C46E8-61CC-4603-A589-7422A47A8E4A}"/>
+    </a:ext>
+  </a:extLst>
+</a:theme>
+</file>
+
+<file path=ppt/theme/theme2.xml><?xml version="1.0" encoding="utf-8"?>
+<a:theme xmlns:a="http://schemas.openxmlformats.org/drawingml/2006/main" name="1_Office Theme">
+  <a:themeElements>
+    <a:clrScheme name="Custom 2">
+      <a:dk1>
+        <a:sysClr val="windowText" lastClr="000000"/>
+      </a:dk1>
+      <a:lt1>
+        <a:sysClr val="window" lastClr="FFFFFF"/>
+      </a:lt1>
+      <a:dk2>
+        <a:srgbClr val="595959"/>
+      </a:dk2>
+      <a:lt2>
+        <a:srgbClr val="E7E6E6"/>
+      </a:lt2>
+      <a:accent1>
+        <a:srgbClr val="165C7D"/>
+      </a:accent1>
+      <a:accent2>
+        <a:srgbClr val="93C90E"/>
+      </a:accent2>
+      <a:accent3>
+        <a:srgbClr val="77C5D5"/>
+      </a:accent3>
+      <a:accent4>
+        <a:srgbClr val="F39130"/>
+      </a:accent4>
+      <a:accent5>
+        <a:srgbClr val="919191"/>
+      </a:accent5>
+      <a:accent6>
+        <a:srgbClr val="F2F2F2"/>
+      </a:accent6>
+      <a:hlink>
+        <a:srgbClr val="165C7D"/>
+      </a:hlink>
+      <a:folHlink>
+        <a:srgbClr val="954F72"/>
+      </a:folHlink>
+    </a:clrScheme>
+    <a:fontScheme name="Custom 10">
+      <a:majorFont>
+        <a:latin typeface="Gotham Light"/>
+        <a:ea typeface=""/>
+        <a:cs typeface=""/>
+      </a:majorFont>
+      <a:minorFont>
+        <a:latin typeface="Gotham Light"/>
+        <a:ea typeface=""/>
+        <a:cs typeface=""/>
+      </a:minorFont>
+    </a:fontScheme>
+    <a:fmtScheme name="Office">
+      <a:fillStyleLst>
+        <a:solidFill>
+          <a:schemeClr val="phClr"/>
+        </a:solidFill>
+        <a:gradFill rotWithShape="1">
+          <a:gsLst>
+            <a:gs pos="0">
+              <a:schemeClr val="phClr">
+                <a:lumMod val="110000"/>
+                <a:satMod val="105000"/>
+                <a:tint val="67000"/>
+              </a:schemeClr>
+            </a:gs>
+            <a:gs pos="50000">
+              <a:schemeClr val="phClr">
+                <a:lumMod val="105000"/>
+                <a:satMod val="103000"/>
+                <a:tint val="73000"/>
+              </a:schemeClr>
+            </a:gs>
+            <a:gs pos="100000">
+              <a:schemeClr val="phClr">
+                <a:lumMod val="105000"/>
+                <a:satMod val="109000"/>
+                <a:tint val="81000"/>
+              </a:schemeClr>
+            </a:gs>
+          </a:gsLst>
+          <a:lin ang="5400000" scaled="0"/>
+        </a:gradFill>
+        <a:gradFill rotWithShape="1">
+          <a:gsLst>
+            <a:gs pos="0">
+              <a:schemeClr val="phClr">
+                <a:satMod val="103000"/>
+                <a:lumMod val="102000"/>
+                <a:tint val="94000"/>
+              </a:schemeClr>
+            </a:gs>
+            <a:gs pos="50000">
+              <a:schemeClr val="phClr">
+                <a:satMod val="110000"/>
+                <a:lumMod val="100000"/>
+                <a:shade val="100000"/>
+              </a:schemeClr>
+            </a:gs>
+            <a:gs pos="100000">
+              <a:schemeClr val="phClr">
+                <a:lumMod val="99000"/>
+                <a:satMod val="120000"/>
+                <a:shade val="78000"/>
+              </a:schemeClr>
+            </a:gs>
+          </a:gsLst>
+          <a:lin ang="5400000" scaled="0"/>
+        </a:gradFill>
+      </a:fillStyleLst>
+      <a:lnStyleLst>
+        <a:ln w="6350" cap="flat" cmpd="sng" algn="ctr">
+          <a:solidFill>
+            <a:schemeClr val="phClr"/>
+          </a:solidFill>
+          <a:prstDash val="solid"/>
+          <a:miter lim="800000"/>
+        </a:ln>
+        <a:ln w="12700" cap="flat" cmpd="sng" algn="ctr">
+          <a:solidFill>
+            <a:schemeClr val="phClr"/>
+          </a:solidFill>
+          <a:prstDash val="solid"/>
+          <a:miter lim="800000"/>
+        </a:ln>
+        <a:ln w="19050" cap="flat" cmpd="sng" algn="ctr">
+          <a:solidFill>
+            <a:schemeClr val="phClr"/>
+          </a:solidFill>
+          <a:prstDash val="solid"/>
+          <a:miter lim="800000"/>
+        </a:ln>
+      </a:lnStyleLst>
+      <a:effectStyleLst>
+        <a:effectStyle>
+          <a:effectLst/>
+        </a:effectStyle>
+        <a:effectStyle>
+          <a:effectLst/>
+        </a:effectStyle>
+        <a:effectStyle>
+          <a:effectLst>
+            <a:outerShdw blurRad="57150" dist="19050" dir="5400000" algn="ctr" rotWithShape="0">
+              <a:srgbClr val="000000">
+                <a:alpha val="63000"/>
+              </a:srgbClr>
+            </a:outerShdw>
+          </a:effectLst>
+        </a:effectStyle>
+      </a:effectStyleLst>
+      <a:bgFillStyleLst>
+        <a:solidFill>
+          <a:schemeClr val="phClr"/>
+        </a:solidFill>
+        <a:solidFill>
+          <a:schemeClr val="phClr">
+            <a:tint val="95000"/>
+            <a:satMod val="170000"/>
+          </a:schemeClr>
+        </a:solidFill>
+        <a:gradFill rotWithShape="1">
+          <a:gsLst>
+            <a:gs pos="0">
+              <a:schemeClr val="phClr">
+                <a:tint val="93000"/>
+                <a:satMod val="150000"/>
+                <a:shade val="98000"/>
+                <a:lumMod val="102000"/>
+              </a:schemeClr>
+            </a:gs>
+            <a:gs pos="50000">
+              <a:schemeClr val="phClr">
+                <a:tint val="98000"/>
+                <a:satMod val="130000"/>
+                <a:shade val="90000"/>
+                <a:lumMod val="103000"/>
+              </a:schemeClr>
+            </a:gs>
+            <a:gs pos="100000">
+              <a:schemeClr val="phClr">
+                <a:shade val="63000"/>
+                <a:satMod val="120000"/>
+              </a:schemeClr>
+            </a:gs>
+          </a:gsLst>
+          <a:lin ang="5400000" scaled="0"/>
+        </a:gradFill>
+      </a:bgFillStyleLst>
+    </a:fmtScheme>
+  </a:themeElements>
+  <a:objectDefaults/>
   <a:extraClrSchemeLst/>
   <a:extLst>
     <a:ext uri="{05A4C25C-085E-4340-85A3-A5531E510DB2}">
@@ -9834,18 +8257,18 @@
 </file>
 
 <file path=customXml/item1.xml><?xml version="1.0" encoding="utf-8"?>
-<p:properties xmlns:p="http://schemas.microsoft.com/office/2006/metadata/properties" xmlns:xsi="http://www.w3.org/2001/XMLSchema-instance" xmlns:pc="http://schemas.microsoft.com/office/infopath/2007/PartnerControls">
-  <documentManagement/>
-</p:properties>
-</file>
-
-<file path=customXml/item2.xml><?xml version="1.0" encoding="utf-8"?>
 <?mso-contentType ?>
 <FormTemplates xmlns="http://schemas.microsoft.com/sharepoint/v3/contenttype/forms">
   <Display>DocumentLibraryForm</Display>
   <Edit>DocumentLibraryForm</Edit>
   <New>DocumentLibraryForm</New>
 </FormTemplates>
+</file>
+
+<file path=customXml/item2.xml><?xml version="1.0" encoding="utf-8"?>
+<p:properties xmlns:p="http://schemas.microsoft.com/office/2006/metadata/properties" xmlns:xsi="http://www.w3.org/2001/XMLSchema-instance" xmlns:pc="http://schemas.microsoft.com/office/infopath/2007/PartnerControls">
+  <documentManagement/>
+</p:properties>
 </file>
 
 <file path=customXml/item3.xml><?xml version="1.0" encoding="utf-8"?>
@@ -10060,18 +8483,18 @@
 </file>
 
 <file path=customXml/itemProps1.xml><?xml version="1.0" encoding="utf-8"?>
-<ds:datastoreItem xmlns:ds="http://schemas.openxmlformats.org/officeDocument/2006/customXml" ds:itemID="{C728879B-660B-4583-928D-55E828E68493}">
+<ds:datastoreItem xmlns:ds="http://schemas.openxmlformats.org/officeDocument/2006/customXml" ds:itemID="{950F9D87-7CA7-4A94-A5E5-A374AFD83891}">
   <ds:schemaRefs>
-    <ds:schemaRef ds:uri="http://schemas.microsoft.com/office/2006/metadata/properties"/>
-    <ds:schemaRef ds:uri="http://schemas.microsoft.com/office/infopath/2007/PartnerControls"/>
+    <ds:schemaRef ds:uri="http://schemas.microsoft.com/sharepoint/v3/contenttype/forms"/>
   </ds:schemaRefs>
 </ds:datastoreItem>
 </file>
 
 <file path=customXml/itemProps2.xml><?xml version="1.0" encoding="utf-8"?>
-<ds:datastoreItem xmlns:ds="http://schemas.openxmlformats.org/officeDocument/2006/customXml" ds:itemID="{950F9D87-7CA7-4A94-A5E5-A374AFD83891}">
+<ds:datastoreItem xmlns:ds="http://schemas.openxmlformats.org/officeDocument/2006/customXml" ds:itemID="{C728879B-660B-4583-928D-55E828E68493}">
   <ds:schemaRefs>
-    <ds:schemaRef ds:uri="http://schemas.microsoft.com/sharepoint/v3/contenttype/forms"/>
+    <ds:schemaRef ds:uri="http://schemas.microsoft.com/office/2006/metadata/properties"/>
+    <ds:schemaRef ds:uri="http://schemas.microsoft.com/office/infopath/2007/PartnerControls"/>
   </ds:schemaRefs>
 </ds:datastoreItem>
 </file>

</xml_diff>